<commit_message>
Updates to the comp examples to remove the comp:identical attribute.
Update to the spec to add in 'name' to everything that had an 'id'.

Updates to the powerpoint examples, too, though they are no longer the canonical versions.
</commit_message>
<xml_diff>
--- a/sbml-level-3/version-1/comp/proposal/HierarchicalSBML.pptx
+++ b/sbml-level-3/version-1/comp/proposal/HierarchicalSBML.pptx
@@ -7,13 +7,13 @@
   <p:sldIdLst>
     <p:sldId id="256" r:id="rId2"/>
   </p:sldIdLst>
-  <p:sldSz cx="3200400" cy="3382963"/>
+  <p:sldSz cx="3200400" cy="2925763"/>
   <p:notesSz cx="6858000" cy="9144000"/>
   <p:defaultTextStyle>
     <a:defPPr>
       <a:defRPr lang="en-US"/>
     </a:defPPr>
-    <a:lvl1pPr marL="0" algn="l" defTabSz="477701" rtl="0" eaLnBrk="1" latinLnBrk="0" hangingPunct="1">
+    <a:lvl1pPr marL="0" algn="l" defTabSz="458020" rtl="0" eaLnBrk="1" latinLnBrk="0" hangingPunct="1">
       <a:defRPr sz="900" kern="1200">
         <a:solidFill>
           <a:schemeClr val="tx1"/>
@@ -23,7 +23,7 @@
         <a:cs typeface="+mn-cs"/>
       </a:defRPr>
     </a:lvl1pPr>
-    <a:lvl2pPr marL="238850" algn="l" defTabSz="477701" rtl="0" eaLnBrk="1" latinLnBrk="0" hangingPunct="1">
+    <a:lvl2pPr marL="229009" algn="l" defTabSz="458020" rtl="0" eaLnBrk="1" latinLnBrk="0" hangingPunct="1">
       <a:defRPr sz="900" kern="1200">
         <a:solidFill>
           <a:schemeClr val="tx1"/>
@@ -33,7 +33,7 @@
         <a:cs typeface="+mn-cs"/>
       </a:defRPr>
     </a:lvl2pPr>
-    <a:lvl3pPr marL="477701" algn="l" defTabSz="477701" rtl="0" eaLnBrk="1" latinLnBrk="0" hangingPunct="1">
+    <a:lvl3pPr marL="458020" algn="l" defTabSz="458020" rtl="0" eaLnBrk="1" latinLnBrk="0" hangingPunct="1">
       <a:defRPr sz="900" kern="1200">
         <a:solidFill>
           <a:schemeClr val="tx1"/>
@@ -43,7 +43,7 @@
         <a:cs typeface="+mn-cs"/>
       </a:defRPr>
     </a:lvl3pPr>
-    <a:lvl4pPr marL="716551" algn="l" defTabSz="477701" rtl="0" eaLnBrk="1" latinLnBrk="0" hangingPunct="1">
+    <a:lvl4pPr marL="687029" algn="l" defTabSz="458020" rtl="0" eaLnBrk="1" latinLnBrk="0" hangingPunct="1">
       <a:defRPr sz="900" kern="1200">
         <a:solidFill>
           <a:schemeClr val="tx1"/>
@@ -53,7 +53,7 @@
         <a:cs typeface="+mn-cs"/>
       </a:defRPr>
     </a:lvl4pPr>
-    <a:lvl5pPr marL="955401" algn="l" defTabSz="477701" rtl="0" eaLnBrk="1" latinLnBrk="0" hangingPunct="1">
+    <a:lvl5pPr marL="916038" algn="l" defTabSz="458020" rtl="0" eaLnBrk="1" latinLnBrk="0" hangingPunct="1">
       <a:defRPr sz="900" kern="1200">
         <a:solidFill>
           <a:schemeClr val="tx1"/>
@@ -63,7 +63,7 @@
         <a:cs typeface="+mn-cs"/>
       </a:defRPr>
     </a:lvl5pPr>
-    <a:lvl6pPr marL="1194251" algn="l" defTabSz="477701" rtl="0" eaLnBrk="1" latinLnBrk="0" hangingPunct="1">
+    <a:lvl6pPr marL="1145048" algn="l" defTabSz="458020" rtl="0" eaLnBrk="1" latinLnBrk="0" hangingPunct="1">
       <a:defRPr sz="900" kern="1200">
         <a:solidFill>
           <a:schemeClr val="tx1"/>
@@ -73,7 +73,7 @@
         <a:cs typeface="+mn-cs"/>
       </a:defRPr>
     </a:lvl6pPr>
-    <a:lvl7pPr marL="1433101" algn="l" defTabSz="477701" rtl="0" eaLnBrk="1" latinLnBrk="0" hangingPunct="1">
+    <a:lvl7pPr marL="1374057" algn="l" defTabSz="458020" rtl="0" eaLnBrk="1" latinLnBrk="0" hangingPunct="1">
       <a:defRPr sz="900" kern="1200">
         <a:solidFill>
           <a:schemeClr val="tx1"/>
@@ -83,7 +83,7 @@
         <a:cs typeface="+mn-cs"/>
       </a:defRPr>
     </a:lvl7pPr>
-    <a:lvl8pPr marL="1671951" algn="l" defTabSz="477701" rtl="0" eaLnBrk="1" latinLnBrk="0" hangingPunct="1">
+    <a:lvl8pPr marL="1603067" algn="l" defTabSz="458020" rtl="0" eaLnBrk="1" latinLnBrk="0" hangingPunct="1">
       <a:defRPr sz="900" kern="1200">
         <a:solidFill>
           <a:schemeClr val="tx1"/>
@@ -93,7 +93,7 @@
         <a:cs typeface="+mn-cs"/>
       </a:defRPr>
     </a:lvl8pPr>
-    <a:lvl9pPr marL="1910802" algn="l" defTabSz="477701" rtl="0" eaLnBrk="1" latinLnBrk="0" hangingPunct="1">
+    <a:lvl9pPr marL="1832077" algn="l" defTabSz="458020" rtl="0" eaLnBrk="1" latinLnBrk="0" hangingPunct="1">
       <a:defRPr sz="900" kern="1200">
         <a:solidFill>
           <a:schemeClr val="tx1"/>
@@ -136,8 +136,8 @@
         </p:nvSpPr>
         <p:spPr>
           <a:xfrm>
-            <a:off x="240030" y="1050924"/>
-            <a:ext cx="2720340" cy="725146"/>
+            <a:off x="240030" y="908895"/>
+            <a:ext cx="2720340" cy="627144"/>
           </a:xfrm>
         </p:spPr>
         <p:txBody>
@@ -164,8 +164,8 @@
         </p:nvSpPr>
         <p:spPr>
           <a:xfrm>
-            <a:off x="480060" y="1917013"/>
-            <a:ext cx="2240280" cy="864535"/>
+            <a:off x="480060" y="1657937"/>
+            <a:ext cx="2240280" cy="747695"/>
           </a:xfrm>
         </p:spPr>
         <p:txBody>
@@ -181,7 +181,7 @@
                 </a:solidFill>
               </a:defRPr>
             </a:lvl1pPr>
-            <a:lvl2pPr marL="238850" indent="0" algn="ctr">
+            <a:lvl2pPr marL="229009" indent="0" algn="ctr">
               <a:buNone/>
               <a:defRPr>
                 <a:solidFill>
@@ -191,7 +191,7 @@
                 </a:solidFill>
               </a:defRPr>
             </a:lvl2pPr>
-            <a:lvl3pPr marL="477701" indent="0" algn="ctr">
+            <a:lvl3pPr marL="458020" indent="0" algn="ctr">
               <a:buNone/>
               <a:defRPr>
                 <a:solidFill>
@@ -201,7 +201,7 @@
                 </a:solidFill>
               </a:defRPr>
             </a:lvl3pPr>
-            <a:lvl4pPr marL="716551" indent="0" algn="ctr">
+            <a:lvl4pPr marL="687029" indent="0" algn="ctr">
               <a:buNone/>
               <a:defRPr>
                 <a:solidFill>
@@ -211,7 +211,7 @@
                 </a:solidFill>
               </a:defRPr>
             </a:lvl4pPr>
-            <a:lvl5pPr marL="955401" indent="0" algn="ctr">
+            <a:lvl5pPr marL="916038" indent="0" algn="ctr">
               <a:buNone/>
               <a:defRPr>
                 <a:solidFill>
@@ -221,7 +221,7 @@
                 </a:solidFill>
               </a:defRPr>
             </a:lvl5pPr>
-            <a:lvl6pPr marL="1194251" indent="0" algn="ctr">
+            <a:lvl6pPr marL="1145048" indent="0" algn="ctr">
               <a:buNone/>
               <a:defRPr>
                 <a:solidFill>
@@ -231,7 +231,7 @@
                 </a:solidFill>
               </a:defRPr>
             </a:lvl6pPr>
-            <a:lvl7pPr marL="1433101" indent="0" algn="ctr">
+            <a:lvl7pPr marL="1374057" indent="0" algn="ctr">
               <a:buNone/>
               <a:defRPr>
                 <a:solidFill>
@@ -241,7 +241,7 @@
                 </a:solidFill>
               </a:defRPr>
             </a:lvl7pPr>
-            <a:lvl8pPr marL="1671951" indent="0" algn="ctr">
+            <a:lvl8pPr marL="1603067" indent="0" algn="ctr">
               <a:buNone/>
               <a:defRPr>
                 <a:solidFill>
@@ -251,7 +251,7 @@
                 </a:solidFill>
               </a:defRPr>
             </a:lvl8pPr>
-            <a:lvl9pPr marL="1910802" indent="0" algn="ctr">
+            <a:lvl9pPr marL="1832077" indent="0" algn="ctr">
               <a:buNone/>
               <a:defRPr>
                 <a:solidFill>
@@ -288,7 +288,7 @@
           <a:p>
             <a:fld id="{F0172217-DC24-48CD-AE89-68C8C8D878B4}" type="datetimeFigureOut">
               <a:rPr lang="en-US" smtClean="0"/>
-              <a:t>5/17/2011</a:t>
+              <a:t>8/30/2011</a:t>
             </a:fld>
             <a:endParaRPr lang="en-US"/>
           </a:p>
@@ -458,7 +458,7 @@
           <a:p>
             <a:fld id="{F0172217-DC24-48CD-AE89-68C8C8D878B4}" type="datetimeFigureOut">
               <a:rPr lang="en-US" smtClean="0"/>
-              <a:t>5/17/2011</a:t>
+              <a:t>8/30/2011</a:t>
             </a:fld>
             <a:endParaRPr lang="en-US"/>
           </a:p>
@@ -548,8 +548,8 @@
         </p:nvSpPr>
         <p:spPr>
           <a:xfrm>
-            <a:off x="2320290" y="135485"/>
-            <a:ext cx="720090" cy="2886484"/>
+            <a:off x="2320291" y="117174"/>
+            <a:ext cx="720090" cy="2496382"/>
           </a:xfrm>
         </p:spPr>
         <p:txBody>
@@ -576,8 +576,8 @@
         </p:nvSpPr>
         <p:spPr>
           <a:xfrm>
-            <a:off x="160020" y="135485"/>
-            <a:ext cx="2106930" cy="2886484"/>
+            <a:off x="160020" y="117174"/>
+            <a:ext cx="2106930" cy="2496382"/>
           </a:xfrm>
         </p:spPr>
         <p:txBody>
@@ -638,7 +638,7 @@
           <a:p>
             <a:fld id="{F0172217-DC24-48CD-AE89-68C8C8D878B4}" type="datetimeFigureOut">
               <a:rPr lang="en-US" smtClean="0"/>
-              <a:t>5/17/2011</a:t>
+              <a:t>8/30/2011</a:t>
             </a:fld>
             <a:endParaRPr lang="en-US"/>
           </a:p>
@@ -808,7 +808,7 @@
           <a:p>
             <a:fld id="{F0172217-DC24-48CD-AE89-68C8C8D878B4}" type="datetimeFigureOut">
               <a:rPr lang="en-US" smtClean="0"/>
-              <a:t>5/17/2011</a:t>
+              <a:t>8/30/2011</a:t>
             </a:fld>
             <a:endParaRPr lang="en-US"/>
           </a:p>
@@ -898,15 +898,15 @@
         </p:nvSpPr>
         <p:spPr>
           <a:xfrm>
-            <a:off x="252810" y="2173871"/>
-            <a:ext cx="2720340" cy="671894"/>
+            <a:off x="252810" y="1880077"/>
+            <a:ext cx="2720340" cy="581089"/>
           </a:xfrm>
         </p:spPr>
         <p:txBody>
           <a:bodyPr anchor="t"/>
           <a:lstStyle>
             <a:lvl1pPr algn="l">
-              <a:defRPr sz="2100" b="1" cap="all"/>
+              <a:defRPr sz="2000" b="1" cap="all"/>
             </a:lvl1pPr>
           </a:lstStyle>
           <a:p>
@@ -930,8 +930,8 @@
         </p:nvSpPr>
         <p:spPr>
           <a:xfrm>
-            <a:off x="252810" y="1433853"/>
-            <a:ext cx="2720340" cy="740022"/>
+            <a:off x="252810" y="1240071"/>
+            <a:ext cx="2720340" cy="640009"/>
           </a:xfrm>
         </p:spPr>
         <p:txBody>
@@ -947,7 +947,7 @@
                 </a:solidFill>
               </a:defRPr>
             </a:lvl1pPr>
-            <a:lvl2pPr marL="238850" indent="0">
+            <a:lvl2pPr marL="229009" indent="0">
               <a:buNone/>
               <a:defRPr sz="900">
                 <a:solidFill>
@@ -957,7 +957,7 @@
                 </a:solidFill>
               </a:defRPr>
             </a:lvl2pPr>
-            <a:lvl3pPr marL="477701" indent="0">
+            <a:lvl3pPr marL="458020" indent="0">
               <a:buNone/>
               <a:defRPr sz="800">
                 <a:solidFill>
@@ -967,7 +967,7 @@
                 </a:solidFill>
               </a:defRPr>
             </a:lvl3pPr>
-            <a:lvl4pPr marL="716551" indent="0">
+            <a:lvl4pPr marL="687029" indent="0">
               <a:buNone/>
               <a:defRPr sz="700">
                 <a:solidFill>
@@ -977,7 +977,7 @@
                 </a:solidFill>
               </a:defRPr>
             </a:lvl4pPr>
-            <a:lvl5pPr marL="955401" indent="0">
+            <a:lvl5pPr marL="916038" indent="0">
               <a:buNone/>
               <a:defRPr sz="700">
                 <a:solidFill>
@@ -987,7 +987,7 @@
                 </a:solidFill>
               </a:defRPr>
             </a:lvl5pPr>
-            <a:lvl6pPr marL="1194251" indent="0">
+            <a:lvl6pPr marL="1145048" indent="0">
               <a:buNone/>
               <a:defRPr sz="700">
                 <a:solidFill>
@@ -997,7 +997,7 @@
                 </a:solidFill>
               </a:defRPr>
             </a:lvl6pPr>
-            <a:lvl7pPr marL="1433101" indent="0">
+            <a:lvl7pPr marL="1374057" indent="0">
               <a:buNone/>
               <a:defRPr sz="700">
                 <a:solidFill>
@@ -1007,7 +1007,7 @@
                 </a:solidFill>
               </a:defRPr>
             </a:lvl7pPr>
-            <a:lvl8pPr marL="1671951" indent="0">
+            <a:lvl8pPr marL="1603067" indent="0">
               <a:buNone/>
               <a:defRPr sz="700">
                 <a:solidFill>
@@ -1017,7 +1017,7 @@
                 </a:solidFill>
               </a:defRPr>
             </a:lvl8pPr>
-            <a:lvl9pPr marL="1910802" indent="0">
+            <a:lvl9pPr marL="1832077" indent="0">
               <a:buNone/>
               <a:defRPr sz="700">
                 <a:solidFill>
@@ -1054,7 +1054,7 @@
           <a:p>
             <a:fld id="{F0172217-DC24-48CD-AE89-68C8C8D878B4}" type="datetimeFigureOut">
               <a:rPr lang="en-US" smtClean="0"/>
-              <a:t>5/17/2011</a:t>
+              <a:t>8/30/2011</a:t>
             </a:fld>
             <a:endParaRPr lang="en-US"/>
           </a:p>
@@ -1167,15 +1167,15 @@
         </p:nvSpPr>
         <p:spPr>
           <a:xfrm>
-            <a:off x="160020" y="789363"/>
-            <a:ext cx="1413510" cy="2232600"/>
+            <a:off x="160020" y="682683"/>
+            <a:ext cx="1413510" cy="1930869"/>
           </a:xfrm>
         </p:spPr>
         <p:txBody>
           <a:bodyPr/>
           <a:lstStyle>
             <a:lvl1pPr>
-              <a:defRPr sz="1400"/>
+              <a:defRPr sz="1300"/>
             </a:lvl1pPr>
             <a:lvl2pPr>
               <a:defRPr sz="1200"/>
@@ -1252,15 +1252,15 @@
         </p:nvSpPr>
         <p:spPr>
           <a:xfrm>
-            <a:off x="1626870" y="789363"/>
-            <a:ext cx="1413510" cy="2232600"/>
+            <a:off x="1626870" y="682683"/>
+            <a:ext cx="1413510" cy="1930869"/>
           </a:xfrm>
         </p:spPr>
         <p:txBody>
           <a:bodyPr/>
           <a:lstStyle>
             <a:lvl1pPr>
-              <a:defRPr sz="1400"/>
+              <a:defRPr sz="1300"/>
             </a:lvl1pPr>
             <a:lvl2pPr>
               <a:defRPr sz="1200"/>
@@ -1342,7 +1342,7 @@
           <a:p>
             <a:fld id="{F0172217-DC24-48CD-AE89-68C8C8D878B4}" type="datetimeFigureOut">
               <a:rPr lang="en-US" smtClean="0"/>
-              <a:t>5/17/2011</a:t>
+              <a:t>8/30/2011</a:t>
             </a:fld>
             <a:endParaRPr lang="en-US"/>
           </a:p>
@@ -1459,8 +1459,8 @@
         </p:nvSpPr>
         <p:spPr>
           <a:xfrm>
-            <a:off x="160029" y="757259"/>
-            <a:ext cx="1414065" cy="315587"/>
+            <a:off x="160032" y="654921"/>
+            <a:ext cx="1414065" cy="272936"/>
           </a:xfrm>
         </p:spPr>
         <p:txBody>
@@ -1470,35 +1470,35 @@
               <a:buNone/>
               <a:defRPr sz="1200" b="1"/>
             </a:lvl1pPr>
-            <a:lvl2pPr marL="238850" indent="0">
+            <a:lvl2pPr marL="229009" indent="0">
               <a:buNone/>
               <a:defRPr sz="1100" b="1"/>
             </a:lvl2pPr>
-            <a:lvl3pPr marL="477701" indent="0">
+            <a:lvl3pPr marL="458020" indent="0">
               <a:buNone/>
               <a:defRPr sz="900" b="1"/>
             </a:lvl3pPr>
-            <a:lvl4pPr marL="716551" indent="0">
+            <a:lvl4pPr marL="687029" indent="0">
               <a:buNone/>
               <a:defRPr sz="800" b="1"/>
             </a:lvl4pPr>
-            <a:lvl5pPr marL="955401" indent="0">
+            <a:lvl5pPr marL="916038" indent="0">
               <a:buNone/>
               <a:defRPr sz="800" b="1"/>
             </a:lvl5pPr>
-            <a:lvl6pPr marL="1194251" indent="0">
+            <a:lvl6pPr marL="1145048" indent="0">
               <a:buNone/>
               <a:defRPr sz="800" b="1"/>
             </a:lvl6pPr>
-            <a:lvl7pPr marL="1433101" indent="0">
+            <a:lvl7pPr marL="1374057" indent="0">
               <a:buNone/>
               <a:defRPr sz="800" b="1"/>
             </a:lvl7pPr>
-            <a:lvl8pPr marL="1671951" indent="0">
+            <a:lvl8pPr marL="1603067" indent="0">
               <a:buNone/>
               <a:defRPr sz="800" b="1"/>
             </a:lvl8pPr>
-            <a:lvl9pPr marL="1910802" indent="0">
+            <a:lvl9pPr marL="1832077" indent="0">
               <a:buNone/>
               <a:defRPr sz="800" b="1"/>
             </a:lvl9pPr>
@@ -1524,8 +1524,8 @@
         </p:nvSpPr>
         <p:spPr>
           <a:xfrm>
-            <a:off x="160029" y="1072845"/>
-            <a:ext cx="1414065" cy="1949120"/>
+            <a:off x="160032" y="927852"/>
+            <a:ext cx="1414065" cy="1685701"/>
           </a:xfrm>
         </p:spPr>
         <p:txBody>
@@ -1609,8 +1609,8 @@
         </p:nvSpPr>
         <p:spPr>
           <a:xfrm>
-            <a:off x="1625763" y="757259"/>
-            <a:ext cx="1414622" cy="315587"/>
+            <a:off x="1625764" y="654921"/>
+            <a:ext cx="1414623" cy="272936"/>
           </a:xfrm>
         </p:spPr>
         <p:txBody>
@@ -1620,35 +1620,35 @@
               <a:buNone/>
               <a:defRPr sz="1200" b="1"/>
             </a:lvl1pPr>
-            <a:lvl2pPr marL="238850" indent="0">
+            <a:lvl2pPr marL="229009" indent="0">
               <a:buNone/>
               <a:defRPr sz="1100" b="1"/>
             </a:lvl2pPr>
-            <a:lvl3pPr marL="477701" indent="0">
+            <a:lvl3pPr marL="458020" indent="0">
               <a:buNone/>
               <a:defRPr sz="900" b="1"/>
             </a:lvl3pPr>
-            <a:lvl4pPr marL="716551" indent="0">
+            <a:lvl4pPr marL="687029" indent="0">
               <a:buNone/>
               <a:defRPr sz="800" b="1"/>
             </a:lvl4pPr>
-            <a:lvl5pPr marL="955401" indent="0">
+            <a:lvl5pPr marL="916038" indent="0">
               <a:buNone/>
               <a:defRPr sz="800" b="1"/>
             </a:lvl5pPr>
-            <a:lvl6pPr marL="1194251" indent="0">
+            <a:lvl6pPr marL="1145048" indent="0">
               <a:buNone/>
               <a:defRPr sz="800" b="1"/>
             </a:lvl6pPr>
-            <a:lvl7pPr marL="1433101" indent="0">
+            <a:lvl7pPr marL="1374057" indent="0">
               <a:buNone/>
               <a:defRPr sz="800" b="1"/>
             </a:lvl7pPr>
-            <a:lvl8pPr marL="1671951" indent="0">
+            <a:lvl8pPr marL="1603067" indent="0">
               <a:buNone/>
               <a:defRPr sz="800" b="1"/>
             </a:lvl8pPr>
-            <a:lvl9pPr marL="1910802" indent="0">
+            <a:lvl9pPr marL="1832077" indent="0">
               <a:buNone/>
               <a:defRPr sz="800" b="1"/>
             </a:lvl9pPr>
@@ -1674,8 +1674,8 @@
         </p:nvSpPr>
         <p:spPr>
           <a:xfrm>
-            <a:off x="1625763" y="1072845"/>
-            <a:ext cx="1414622" cy="1949120"/>
+            <a:off x="1625764" y="927852"/>
+            <a:ext cx="1414623" cy="1685701"/>
           </a:xfrm>
         </p:spPr>
         <p:txBody>
@@ -1764,7 +1764,7 @@
           <a:p>
             <a:fld id="{F0172217-DC24-48CD-AE89-68C8C8D878B4}" type="datetimeFigureOut">
               <a:rPr lang="en-US" smtClean="0"/>
-              <a:t>5/17/2011</a:t>
+              <a:t>8/30/2011</a:t>
             </a:fld>
             <a:endParaRPr lang="en-US"/>
           </a:p>
@@ -1882,7 +1882,7 @@
           <a:p>
             <a:fld id="{F0172217-DC24-48CD-AE89-68C8C8D878B4}" type="datetimeFigureOut">
               <a:rPr lang="en-US" smtClean="0"/>
-              <a:t>5/17/2011</a:t>
+              <a:t>8/30/2011</a:t>
             </a:fld>
             <a:endParaRPr lang="en-US"/>
           </a:p>
@@ -1977,7 +1977,7 @@
           <a:p>
             <a:fld id="{F0172217-DC24-48CD-AE89-68C8C8D878B4}" type="datetimeFigureOut">
               <a:rPr lang="en-US" smtClean="0"/>
-              <a:t>5/17/2011</a:t>
+              <a:t>8/30/2011</a:t>
             </a:fld>
             <a:endParaRPr lang="en-US"/>
           </a:p>
@@ -2067,8 +2067,8 @@
         </p:nvSpPr>
         <p:spPr>
           <a:xfrm>
-            <a:off x="160021" y="134697"/>
-            <a:ext cx="1052910" cy="573223"/>
+            <a:off x="160021" y="116497"/>
+            <a:ext cx="1052910" cy="495753"/>
           </a:xfrm>
         </p:spPr>
         <p:txBody>
@@ -2099,18 +2099,18 @@
         </p:nvSpPr>
         <p:spPr>
           <a:xfrm>
-            <a:off x="1251269" y="134699"/>
-            <a:ext cx="1789112" cy="2887267"/>
+            <a:off x="1251270" y="116498"/>
+            <a:ext cx="1789112" cy="2497059"/>
           </a:xfrm>
         </p:spPr>
         <p:txBody>
           <a:bodyPr/>
           <a:lstStyle>
             <a:lvl1pPr>
-              <a:defRPr sz="1700"/>
+              <a:defRPr sz="1600"/>
             </a:lvl1pPr>
             <a:lvl2pPr>
-              <a:defRPr sz="1400"/>
+              <a:defRPr sz="1300"/>
             </a:lvl2pPr>
             <a:lvl3pPr>
               <a:defRPr sz="1200"/>
@@ -2184,8 +2184,8 @@
         </p:nvSpPr>
         <p:spPr>
           <a:xfrm>
-            <a:off x="160021" y="707928"/>
-            <a:ext cx="1052910" cy="2314043"/>
+            <a:off x="160021" y="612257"/>
+            <a:ext cx="1052910" cy="2001305"/>
           </a:xfrm>
         </p:spPr>
         <p:txBody>
@@ -2195,35 +2195,35 @@
               <a:buNone/>
               <a:defRPr sz="700"/>
             </a:lvl1pPr>
-            <a:lvl2pPr marL="238850" indent="0">
+            <a:lvl2pPr marL="229009" indent="0">
               <a:buNone/>
               <a:defRPr sz="700"/>
             </a:lvl2pPr>
-            <a:lvl3pPr marL="477701" indent="0">
+            <a:lvl3pPr marL="458020" indent="0">
               <a:buNone/>
               <a:defRPr sz="500"/>
             </a:lvl3pPr>
-            <a:lvl4pPr marL="716551" indent="0">
+            <a:lvl4pPr marL="687029" indent="0">
               <a:buNone/>
               <a:defRPr sz="500"/>
             </a:lvl4pPr>
-            <a:lvl5pPr marL="955401" indent="0">
+            <a:lvl5pPr marL="916038" indent="0">
               <a:buNone/>
               <a:defRPr sz="500"/>
             </a:lvl5pPr>
-            <a:lvl6pPr marL="1194251" indent="0">
+            <a:lvl6pPr marL="1145048" indent="0">
               <a:buNone/>
               <a:defRPr sz="500"/>
             </a:lvl6pPr>
-            <a:lvl7pPr marL="1433101" indent="0">
+            <a:lvl7pPr marL="1374057" indent="0">
               <a:buNone/>
               <a:defRPr sz="500"/>
             </a:lvl7pPr>
-            <a:lvl8pPr marL="1671951" indent="0">
+            <a:lvl8pPr marL="1603067" indent="0">
               <a:buNone/>
               <a:defRPr sz="500"/>
             </a:lvl8pPr>
-            <a:lvl9pPr marL="1910802" indent="0">
+            <a:lvl9pPr marL="1832077" indent="0">
               <a:buNone/>
               <a:defRPr sz="500"/>
             </a:lvl9pPr>
@@ -2254,7 +2254,7 @@
           <a:p>
             <a:fld id="{F0172217-DC24-48CD-AE89-68C8C8D878B4}" type="datetimeFigureOut">
               <a:rPr lang="en-US" smtClean="0"/>
-              <a:t>5/17/2011</a:t>
+              <a:t>8/30/2011</a:t>
             </a:fld>
             <a:endParaRPr lang="en-US"/>
           </a:p>
@@ -2344,8 +2344,8 @@
         </p:nvSpPr>
         <p:spPr>
           <a:xfrm>
-            <a:off x="627300" y="2368084"/>
-            <a:ext cx="1920240" cy="279567"/>
+            <a:off x="627300" y="2048047"/>
+            <a:ext cx="1920240" cy="241784"/>
           </a:xfrm>
         </p:spPr>
         <p:txBody>
@@ -2376,8 +2376,8 @@
         </p:nvSpPr>
         <p:spPr>
           <a:xfrm>
-            <a:off x="627300" y="302279"/>
-            <a:ext cx="1920240" cy="2029778"/>
+            <a:off x="627300" y="261426"/>
+            <a:ext cx="1920240" cy="1755458"/>
           </a:xfrm>
         </p:spPr>
         <p:txBody>
@@ -2385,37 +2385,37 @@
           <a:lstStyle>
             <a:lvl1pPr marL="0" indent="0">
               <a:buNone/>
-              <a:defRPr sz="1700"/>
+              <a:defRPr sz="1600"/>
             </a:lvl1pPr>
-            <a:lvl2pPr marL="238850" indent="0">
-              <a:buNone/>
-              <a:defRPr sz="1400"/>
+            <a:lvl2pPr marL="229009" indent="0">
+              <a:buNone/>
+              <a:defRPr sz="1300"/>
             </a:lvl2pPr>
-            <a:lvl3pPr marL="477701" indent="0">
+            <a:lvl3pPr marL="458020" indent="0">
               <a:buNone/>
               <a:defRPr sz="1200"/>
             </a:lvl3pPr>
-            <a:lvl4pPr marL="716551" indent="0">
+            <a:lvl4pPr marL="687029" indent="0">
               <a:buNone/>
               <a:defRPr sz="1100"/>
             </a:lvl4pPr>
-            <a:lvl5pPr marL="955401" indent="0">
+            <a:lvl5pPr marL="916038" indent="0">
               <a:buNone/>
               <a:defRPr sz="1100"/>
             </a:lvl5pPr>
-            <a:lvl6pPr marL="1194251" indent="0">
+            <a:lvl6pPr marL="1145048" indent="0">
               <a:buNone/>
               <a:defRPr sz="1100"/>
             </a:lvl6pPr>
-            <a:lvl7pPr marL="1433101" indent="0">
+            <a:lvl7pPr marL="1374057" indent="0">
               <a:buNone/>
               <a:defRPr sz="1100"/>
             </a:lvl7pPr>
-            <a:lvl8pPr marL="1671951" indent="0">
+            <a:lvl8pPr marL="1603067" indent="0">
               <a:buNone/>
               <a:defRPr sz="1100"/>
             </a:lvl8pPr>
-            <a:lvl9pPr marL="1910802" indent="0">
+            <a:lvl9pPr marL="1832077" indent="0">
               <a:buNone/>
               <a:defRPr sz="1100"/>
             </a:lvl9pPr>
@@ -2437,8 +2437,8 @@
         </p:nvSpPr>
         <p:spPr>
           <a:xfrm>
-            <a:off x="627300" y="2647649"/>
-            <a:ext cx="1920240" cy="397031"/>
+            <a:off x="627300" y="2289830"/>
+            <a:ext cx="1920240" cy="343373"/>
           </a:xfrm>
         </p:spPr>
         <p:txBody>
@@ -2448,35 +2448,35 @@
               <a:buNone/>
               <a:defRPr sz="700"/>
             </a:lvl1pPr>
-            <a:lvl2pPr marL="238850" indent="0">
+            <a:lvl2pPr marL="229009" indent="0">
               <a:buNone/>
               <a:defRPr sz="700"/>
             </a:lvl2pPr>
-            <a:lvl3pPr marL="477701" indent="0">
+            <a:lvl3pPr marL="458020" indent="0">
               <a:buNone/>
               <a:defRPr sz="500"/>
             </a:lvl3pPr>
-            <a:lvl4pPr marL="716551" indent="0">
+            <a:lvl4pPr marL="687029" indent="0">
               <a:buNone/>
               <a:defRPr sz="500"/>
             </a:lvl4pPr>
-            <a:lvl5pPr marL="955401" indent="0">
+            <a:lvl5pPr marL="916038" indent="0">
               <a:buNone/>
               <a:defRPr sz="500"/>
             </a:lvl5pPr>
-            <a:lvl6pPr marL="1194251" indent="0">
+            <a:lvl6pPr marL="1145048" indent="0">
               <a:buNone/>
               <a:defRPr sz="500"/>
             </a:lvl6pPr>
-            <a:lvl7pPr marL="1433101" indent="0">
+            <a:lvl7pPr marL="1374057" indent="0">
               <a:buNone/>
               <a:defRPr sz="500"/>
             </a:lvl7pPr>
-            <a:lvl8pPr marL="1671951" indent="0">
+            <a:lvl8pPr marL="1603067" indent="0">
               <a:buNone/>
               <a:defRPr sz="500"/>
             </a:lvl8pPr>
-            <a:lvl9pPr marL="1910802" indent="0">
+            <a:lvl9pPr marL="1832077" indent="0">
               <a:buNone/>
               <a:defRPr sz="500"/>
             </a:lvl9pPr>
@@ -2507,7 +2507,7 @@
           <a:p>
             <a:fld id="{F0172217-DC24-48CD-AE89-68C8C8D878B4}" type="datetimeFigureOut">
               <a:rPr lang="en-US" smtClean="0"/>
-              <a:t>5/17/2011</a:t>
+              <a:t>8/30/2011</a:t>
             </a:fld>
             <a:endParaRPr lang="en-US"/>
           </a:p>
@@ -2602,15 +2602,15 @@
         </p:nvSpPr>
         <p:spPr>
           <a:xfrm>
-            <a:off x="160020" y="135480"/>
-            <a:ext cx="2880360" cy="563827"/>
+            <a:off x="160020" y="117174"/>
+            <a:ext cx="2880360" cy="487627"/>
           </a:xfrm>
           <a:prstGeom prst="rect">
             <a:avLst/>
           </a:prstGeom>
         </p:spPr>
         <p:txBody>
-          <a:bodyPr vert="horz" lIns="47770" tIns="23885" rIns="47770" bIns="23885" rtlCol="0" anchor="ctr">
+          <a:bodyPr vert="horz" lIns="45802" tIns="22901" rIns="45802" bIns="22901" rtlCol="0" anchor="ctr">
             <a:normAutofit/>
           </a:bodyPr>
           <a:lstStyle/>
@@ -2635,15 +2635,15 @@
         </p:nvSpPr>
         <p:spPr>
           <a:xfrm>
-            <a:off x="160020" y="789363"/>
-            <a:ext cx="2880360" cy="2232600"/>
+            <a:off x="160020" y="682683"/>
+            <a:ext cx="2880360" cy="1930869"/>
           </a:xfrm>
           <a:prstGeom prst="rect">
             <a:avLst/>
           </a:prstGeom>
         </p:spPr>
         <p:txBody>
-          <a:bodyPr vert="horz" lIns="47770" tIns="23885" rIns="47770" bIns="23885" rtlCol="0">
+          <a:bodyPr vert="horz" lIns="45802" tIns="22901" rIns="45802" bIns="22901" rtlCol="0">
             <a:normAutofit/>
           </a:bodyPr>
           <a:lstStyle/>
@@ -2697,15 +2697,15 @@
         </p:nvSpPr>
         <p:spPr>
           <a:xfrm>
-            <a:off x="160020" y="3135520"/>
-            <a:ext cx="746760" cy="180113"/>
+            <a:off x="160020" y="2711766"/>
+            <a:ext cx="746760" cy="155771"/>
           </a:xfrm>
           <a:prstGeom prst="rect">
             <a:avLst/>
           </a:prstGeom>
         </p:spPr>
         <p:txBody>
-          <a:bodyPr vert="horz" lIns="47770" tIns="23885" rIns="47770" bIns="23885" rtlCol="0" anchor="ctr"/>
+          <a:bodyPr vert="horz" lIns="45802" tIns="22901" rIns="45802" bIns="22901" rtlCol="0" anchor="ctr"/>
           <a:lstStyle>
             <a:lvl1pPr algn="l">
               <a:defRPr sz="700">
@@ -2720,7 +2720,7 @@
           <a:p>
             <a:fld id="{F0172217-DC24-48CD-AE89-68C8C8D878B4}" type="datetimeFigureOut">
               <a:rPr lang="en-US" smtClean="0"/>
-              <a:t>5/17/2011</a:t>
+              <a:t>8/30/2011</a:t>
             </a:fld>
             <a:endParaRPr lang="en-US"/>
           </a:p>
@@ -2738,15 +2738,15 @@
         </p:nvSpPr>
         <p:spPr>
           <a:xfrm>
-            <a:off x="1093470" y="3135520"/>
-            <a:ext cx="1013460" cy="180113"/>
+            <a:off x="1093470" y="2711766"/>
+            <a:ext cx="1013460" cy="155771"/>
           </a:xfrm>
           <a:prstGeom prst="rect">
             <a:avLst/>
           </a:prstGeom>
         </p:spPr>
         <p:txBody>
-          <a:bodyPr vert="horz" lIns="47770" tIns="23885" rIns="47770" bIns="23885" rtlCol="0" anchor="ctr"/>
+          <a:bodyPr vert="horz" lIns="45802" tIns="22901" rIns="45802" bIns="22901" rtlCol="0" anchor="ctr"/>
           <a:lstStyle>
             <a:lvl1pPr algn="ctr">
               <a:defRPr sz="700">
@@ -2775,15 +2775,15 @@
         </p:nvSpPr>
         <p:spPr>
           <a:xfrm>
-            <a:off x="2293620" y="3135520"/>
-            <a:ext cx="746760" cy="180113"/>
+            <a:off x="2293620" y="2711766"/>
+            <a:ext cx="746760" cy="155771"/>
           </a:xfrm>
           <a:prstGeom prst="rect">
             <a:avLst/>
           </a:prstGeom>
         </p:spPr>
         <p:txBody>
-          <a:bodyPr vert="horz" lIns="47770" tIns="23885" rIns="47770" bIns="23885" rtlCol="0" anchor="ctr"/>
+          <a:bodyPr vert="horz" lIns="45802" tIns="22901" rIns="45802" bIns="22901" rtlCol="0" anchor="ctr"/>
           <a:lstStyle>
             <a:lvl1pPr algn="r">
               <a:defRPr sz="700">
@@ -2827,12 +2827,12 @@
   </p:sldLayoutIdLst>
   <p:txStyles>
     <p:titleStyle>
-      <a:lvl1pPr algn="ctr" defTabSz="477701" rtl="0" eaLnBrk="1" latinLnBrk="0" hangingPunct="1">
+      <a:lvl1pPr algn="ctr" defTabSz="458020" rtl="0" eaLnBrk="1" latinLnBrk="0" hangingPunct="1">
         <a:spcBef>
           <a:spcPct val="0"/>
         </a:spcBef>
         <a:buNone/>
-        <a:defRPr sz="2300" kern="1200">
+        <a:defRPr sz="2200" kern="1200">
           <a:solidFill>
             <a:schemeClr val="tx1"/>
           </a:solidFill>
@@ -2843,13 +2843,13 @@
       </a:lvl1pPr>
     </p:titleStyle>
     <p:bodyStyle>
-      <a:lvl1pPr marL="179138" indent="-179138" algn="l" defTabSz="477701" rtl="0" eaLnBrk="1" latinLnBrk="0" hangingPunct="1">
+      <a:lvl1pPr marL="171758" indent="-171758" algn="l" defTabSz="458020" rtl="0" eaLnBrk="1" latinLnBrk="0" hangingPunct="1">
         <a:spcBef>
           <a:spcPct val="20000"/>
         </a:spcBef>
         <a:buFont typeface="Arial" pitchFamily="34" charset="0"/>
         <a:buChar char="•"/>
-        <a:defRPr sz="1700" kern="1200">
+        <a:defRPr sz="1600" kern="1200">
           <a:solidFill>
             <a:schemeClr val="tx1"/>
           </a:solidFill>
@@ -2858,13 +2858,13 @@
           <a:cs typeface="+mn-cs"/>
         </a:defRPr>
       </a:lvl1pPr>
-      <a:lvl2pPr marL="388132" indent="-149281" algn="l" defTabSz="477701" rtl="0" eaLnBrk="1" latinLnBrk="0" hangingPunct="1">
+      <a:lvl2pPr marL="372141" indent="-143131" algn="l" defTabSz="458020" rtl="0" eaLnBrk="1" latinLnBrk="0" hangingPunct="1">
         <a:spcBef>
           <a:spcPct val="20000"/>
         </a:spcBef>
         <a:buFont typeface="Arial" pitchFamily="34" charset="0"/>
         <a:buChar char="–"/>
-        <a:defRPr sz="1400" kern="1200">
+        <a:defRPr sz="1300" kern="1200">
           <a:solidFill>
             <a:schemeClr val="tx1"/>
           </a:solidFill>
@@ -2873,7 +2873,7 @@
           <a:cs typeface="+mn-cs"/>
         </a:defRPr>
       </a:lvl2pPr>
-      <a:lvl3pPr marL="597125" indent="-119425" algn="l" defTabSz="477701" rtl="0" eaLnBrk="1" latinLnBrk="0" hangingPunct="1">
+      <a:lvl3pPr marL="572523" indent="-114505" algn="l" defTabSz="458020" rtl="0" eaLnBrk="1" latinLnBrk="0" hangingPunct="1">
         <a:spcBef>
           <a:spcPct val="20000"/>
         </a:spcBef>
@@ -2888,7 +2888,7 @@
           <a:cs typeface="+mn-cs"/>
         </a:defRPr>
       </a:lvl3pPr>
-      <a:lvl4pPr marL="835976" indent="-119425" algn="l" defTabSz="477701" rtl="0" eaLnBrk="1" latinLnBrk="0" hangingPunct="1">
+      <a:lvl4pPr marL="801534" indent="-114505" algn="l" defTabSz="458020" rtl="0" eaLnBrk="1" latinLnBrk="0" hangingPunct="1">
         <a:spcBef>
           <a:spcPct val="20000"/>
         </a:spcBef>
@@ -2903,7 +2903,7 @@
           <a:cs typeface="+mn-cs"/>
         </a:defRPr>
       </a:lvl4pPr>
-      <a:lvl5pPr marL="1074826" indent="-119425" algn="l" defTabSz="477701" rtl="0" eaLnBrk="1" latinLnBrk="0" hangingPunct="1">
+      <a:lvl5pPr marL="1030543" indent="-114505" algn="l" defTabSz="458020" rtl="0" eaLnBrk="1" latinLnBrk="0" hangingPunct="1">
         <a:spcBef>
           <a:spcPct val="20000"/>
         </a:spcBef>
@@ -2918,7 +2918,7 @@
           <a:cs typeface="+mn-cs"/>
         </a:defRPr>
       </a:lvl5pPr>
-      <a:lvl6pPr marL="1313676" indent="-119425" algn="l" defTabSz="477701" rtl="0" eaLnBrk="1" latinLnBrk="0" hangingPunct="1">
+      <a:lvl6pPr marL="1259553" indent="-114505" algn="l" defTabSz="458020" rtl="0" eaLnBrk="1" latinLnBrk="0" hangingPunct="1">
         <a:spcBef>
           <a:spcPct val="20000"/>
         </a:spcBef>
@@ -2933,7 +2933,7 @@
           <a:cs typeface="+mn-cs"/>
         </a:defRPr>
       </a:lvl6pPr>
-      <a:lvl7pPr marL="1552527" indent="-119425" algn="l" defTabSz="477701" rtl="0" eaLnBrk="1" latinLnBrk="0" hangingPunct="1">
+      <a:lvl7pPr marL="1488563" indent="-114505" algn="l" defTabSz="458020" rtl="0" eaLnBrk="1" latinLnBrk="0" hangingPunct="1">
         <a:spcBef>
           <a:spcPct val="20000"/>
         </a:spcBef>
@@ -2948,7 +2948,7 @@
           <a:cs typeface="+mn-cs"/>
         </a:defRPr>
       </a:lvl7pPr>
-      <a:lvl8pPr marL="1791377" indent="-119425" algn="l" defTabSz="477701" rtl="0" eaLnBrk="1" latinLnBrk="0" hangingPunct="1">
+      <a:lvl8pPr marL="1717572" indent="-114505" algn="l" defTabSz="458020" rtl="0" eaLnBrk="1" latinLnBrk="0" hangingPunct="1">
         <a:spcBef>
           <a:spcPct val="20000"/>
         </a:spcBef>
@@ -2963,7 +2963,7 @@
           <a:cs typeface="+mn-cs"/>
         </a:defRPr>
       </a:lvl8pPr>
-      <a:lvl9pPr marL="2030227" indent="-119425" algn="l" defTabSz="477701" rtl="0" eaLnBrk="1" latinLnBrk="0" hangingPunct="1">
+      <a:lvl9pPr marL="1946582" indent="-114505" algn="l" defTabSz="458020" rtl="0" eaLnBrk="1" latinLnBrk="0" hangingPunct="1">
         <a:spcBef>
           <a:spcPct val="20000"/>
         </a:spcBef>
@@ -2983,7 +2983,7 @@
       <a:defPPr>
         <a:defRPr lang="en-US"/>
       </a:defPPr>
-      <a:lvl1pPr marL="0" algn="l" defTabSz="477701" rtl="0" eaLnBrk="1" latinLnBrk="0" hangingPunct="1">
+      <a:lvl1pPr marL="0" algn="l" defTabSz="458020" rtl="0" eaLnBrk="1" latinLnBrk="0" hangingPunct="1">
         <a:defRPr sz="900" kern="1200">
           <a:solidFill>
             <a:schemeClr val="tx1"/>
@@ -2993,7 +2993,7 @@
           <a:cs typeface="+mn-cs"/>
         </a:defRPr>
       </a:lvl1pPr>
-      <a:lvl2pPr marL="238850" algn="l" defTabSz="477701" rtl="0" eaLnBrk="1" latinLnBrk="0" hangingPunct="1">
+      <a:lvl2pPr marL="229009" algn="l" defTabSz="458020" rtl="0" eaLnBrk="1" latinLnBrk="0" hangingPunct="1">
         <a:defRPr sz="900" kern="1200">
           <a:solidFill>
             <a:schemeClr val="tx1"/>
@@ -3003,7 +3003,7 @@
           <a:cs typeface="+mn-cs"/>
         </a:defRPr>
       </a:lvl2pPr>
-      <a:lvl3pPr marL="477701" algn="l" defTabSz="477701" rtl="0" eaLnBrk="1" latinLnBrk="0" hangingPunct="1">
+      <a:lvl3pPr marL="458020" algn="l" defTabSz="458020" rtl="0" eaLnBrk="1" latinLnBrk="0" hangingPunct="1">
         <a:defRPr sz="900" kern="1200">
           <a:solidFill>
             <a:schemeClr val="tx1"/>
@@ -3013,7 +3013,7 @@
           <a:cs typeface="+mn-cs"/>
         </a:defRPr>
       </a:lvl3pPr>
-      <a:lvl4pPr marL="716551" algn="l" defTabSz="477701" rtl="0" eaLnBrk="1" latinLnBrk="0" hangingPunct="1">
+      <a:lvl4pPr marL="687029" algn="l" defTabSz="458020" rtl="0" eaLnBrk="1" latinLnBrk="0" hangingPunct="1">
         <a:defRPr sz="900" kern="1200">
           <a:solidFill>
             <a:schemeClr val="tx1"/>
@@ -3023,7 +3023,7 @@
           <a:cs typeface="+mn-cs"/>
         </a:defRPr>
       </a:lvl4pPr>
-      <a:lvl5pPr marL="955401" algn="l" defTabSz="477701" rtl="0" eaLnBrk="1" latinLnBrk="0" hangingPunct="1">
+      <a:lvl5pPr marL="916038" algn="l" defTabSz="458020" rtl="0" eaLnBrk="1" latinLnBrk="0" hangingPunct="1">
         <a:defRPr sz="900" kern="1200">
           <a:solidFill>
             <a:schemeClr val="tx1"/>
@@ -3033,7 +3033,7 @@
           <a:cs typeface="+mn-cs"/>
         </a:defRPr>
       </a:lvl5pPr>
-      <a:lvl6pPr marL="1194251" algn="l" defTabSz="477701" rtl="0" eaLnBrk="1" latinLnBrk="0" hangingPunct="1">
+      <a:lvl6pPr marL="1145048" algn="l" defTabSz="458020" rtl="0" eaLnBrk="1" latinLnBrk="0" hangingPunct="1">
         <a:defRPr sz="900" kern="1200">
           <a:solidFill>
             <a:schemeClr val="tx1"/>
@@ -3043,7 +3043,7 @@
           <a:cs typeface="+mn-cs"/>
         </a:defRPr>
       </a:lvl6pPr>
-      <a:lvl7pPr marL="1433101" algn="l" defTabSz="477701" rtl="0" eaLnBrk="1" latinLnBrk="0" hangingPunct="1">
+      <a:lvl7pPr marL="1374057" algn="l" defTabSz="458020" rtl="0" eaLnBrk="1" latinLnBrk="0" hangingPunct="1">
         <a:defRPr sz="900" kern="1200">
           <a:solidFill>
             <a:schemeClr val="tx1"/>
@@ -3053,7 +3053,7 @@
           <a:cs typeface="+mn-cs"/>
         </a:defRPr>
       </a:lvl7pPr>
-      <a:lvl8pPr marL="1671951" algn="l" defTabSz="477701" rtl="0" eaLnBrk="1" latinLnBrk="0" hangingPunct="1">
+      <a:lvl8pPr marL="1603067" algn="l" defTabSz="458020" rtl="0" eaLnBrk="1" latinLnBrk="0" hangingPunct="1">
         <a:defRPr sz="900" kern="1200">
           <a:solidFill>
             <a:schemeClr val="tx1"/>
@@ -3063,7 +3063,7 @@
           <a:cs typeface="+mn-cs"/>
         </a:defRPr>
       </a:lvl8pPr>
-      <a:lvl9pPr marL="1910802" algn="l" defTabSz="477701" rtl="0" eaLnBrk="1" latinLnBrk="0" hangingPunct="1">
+      <a:lvl9pPr marL="1832077" algn="l" defTabSz="458020" rtl="0" eaLnBrk="1" latinLnBrk="0" hangingPunct="1">
         <a:defRPr sz="900" kern="1200">
           <a:solidFill>
             <a:schemeClr val="tx1"/>
@@ -3097,1541 +3097,28 @@
       </p:grpSpPr>
       <p:grpSp>
         <p:nvGrpSpPr>
-          <p:cNvPr id="2" name="Group 1"/>
+          <p:cNvPr id="147" name="Group 146"/>
           <p:cNvGrpSpPr/>
           <p:nvPr/>
         </p:nvGrpSpPr>
         <p:grpSpPr>
           <a:xfrm>
-            <a:off x="46522" y="49921"/>
-            <a:ext cx="3107356" cy="3302879"/>
-            <a:chOff x="46522" y="49921"/>
-            <a:chExt cx="3107356" cy="3302879"/>
+            <a:off x="46522" y="31218"/>
+            <a:ext cx="3107356" cy="2862295"/>
+            <a:chOff x="46522" y="25041"/>
+            <a:chExt cx="3107356" cy="2862295"/>
           </a:xfrm>
         </p:grpSpPr>
-        <p:grpSp>
-          <p:nvGrpSpPr>
-            <p:cNvPr id="192" name="Group 191"/>
-            <p:cNvGrpSpPr/>
-            <p:nvPr/>
-          </p:nvGrpSpPr>
-          <p:grpSpPr>
-            <a:xfrm>
-              <a:off x="46522" y="49921"/>
-              <a:ext cx="3107356" cy="3302879"/>
-              <a:chOff x="46522" y="49921"/>
-              <a:chExt cx="3107356" cy="3302879"/>
-            </a:xfrm>
-          </p:grpSpPr>
-          <p:grpSp>
-            <p:nvGrpSpPr>
-              <p:cNvPr id="193" name="Group 192"/>
-              <p:cNvGrpSpPr/>
-              <p:nvPr/>
-            </p:nvGrpSpPr>
-            <p:grpSpPr>
-              <a:xfrm>
-                <a:off x="46522" y="49921"/>
-                <a:ext cx="3107356" cy="3302879"/>
-                <a:chOff x="46522" y="49921"/>
-                <a:chExt cx="3107356" cy="3302879"/>
-              </a:xfrm>
-            </p:grpSpPr>
-            <p:grpSp>
-              <p:nvGrpSpPr>
-                <p:cNvPr id="199" name="Group 198"/>
-                <p:cNvGrpSpPr/>
-                <p:nvPr/>
-              </p:nvGrpSpPr>
-              <p:grpSpPr>
-                <a:xfrm>
-                  <a:off x="46522" y="49921"/>
-                  <a:ext cx="3107356" cy="3302879"/>
-                  <a:chOff x="76200" y="69680"/>
-                  <a:chExt cx="3107356" cy="3302879"/>
-                </a:xfrm>
-              </p:grpSpPr>
-              <p:sp>
-                <p:nvSpPr>
-                  <p:cNvPr id="205" name="Rectangle 204"/>
-                  <p:cNvSpPr/>
-                  <p:nvPr/>
-                </p:nvSpPr>
-                <p:spPr>
-                  <a:xfrm>
-                    <a:off x="145179" y="70254"/>
-                    <a:ext cx="2369421" cy="243840"/>
-                  </a:xfrm>
-                  <a:prstGeom prst="rect">
-                    <a:avLst/>
-                  </a:prstGeom>
-                  <a:noFill/>
-                  <a:ln w="6350">
-                    <a:solidFill>
-                      <a:schemeClr val="tx1"/>
-                    </a:solidFill>
-                  </a:ln>
-                </p:spPr>
-                <p:style>
-                  <a:lnRef idx="2">
-                    <a:schemeClr val="accent1">
-                      <a:shade val="50000"/>
-                    </a:schemeClr>
-                  </a:lnRef>
-                  <a:fillRef idx="1">
-                    <a:schemeClr val="accent1"/>
-                  </a:fillRef>
-                  <a:effectRef idx="0">
-                    <a:schemeClr val="accent1"/>
-                  </a:effectRef>
-                  <a:fontRef idx="minor">
-                    <a:schemeClr val="lt1"/>
-                  </a:fontRef>
-                </p:style>
-                <p:txBody>
-                  <a:bodyPr rtlCol="0" anchor="t"/>
-                  <a:lstStyle/>
-                  <a:p>
-                    <a:pPr algn="ctr"/>
-                    <a:r>
-                      <a:rPr lang="en-US" sz="1100" b="1" dirty="0" smtClean="0">
-                        <a:solidFill>
-                          <a:schemeClr val="tx1"/>
-                        </a:solidFill>
-                      </a:rPr>
-                      <a:t>SBML </a:t>
-                    </a:r>
-                    <a:r>
-                      <a:rPr lang="en-US" b="1" i="1" dirty="0">
-                        <a:solidFill>
-                          <a:srgbClr val="00B050"/>
-                        </a:solidFill>
-                      </a:rPr>
-                      <a:t>(extended</a:t>
-                    </a:r>
-                    <a:r>
-                      <a:rPr lang="en-US" b="1" i="1" dirty="0" smtClean="0">
-                        <a:solidFill>
-                          <a:srgbClr val="00B050"/>
-                        </a:solidFill>
-                      </a:rPr>
-                      <a:t>)</a:t>
-                    </a:r>
-                    <a:endParaRPr lang="en-US" b="1" dirty="0">
-                      <a:solidFill>
-                        <a:schemeClr val="tx1"/>
-                      </a:solidFill>
-                    </a:endParaRPr>
-                  </a:p>
-                </p:txBody>
-              </p:sp>
-              <p:sp>
-                <p:nvSpPr>
-                  <p:cNvPr id="206" name="Diamond 205"/>
-                  <p:cNvSpPr/>
-                  <p:nvPr/>
-                </p:nvSpPr>
-                <p:spPr>
-                  <a:xfrm>
-                    <a:off x="111341" y="312087"/>
-                    <a:ext cx="66869" cy="152398"/>
-                  </a:xfrm>
-                  <a:prstGeom prst="diamond">
-                    <a:avLst/>
-                  </a:prstGeom>
-                  <a:solidFill>
-                    <a:srgbClr val="00B050"/>
-                  </a:solidFill>
-                  <a:ln w="6350">
-                    <a:solidFill>
-                      <a:srgbClr val="00B050"/>
-                    </a:solidFill>
-                  </a:ln>
-                </p:spPr>
-                <p:style>
-                  <a:lnRef idx="2">
-                    <a:schemeClr val="accent1">
-                      <a:shade val="50000"/>
-                    </a:schemeClr>
-                  </a:lnRef>
-                  <a:fillRef idx="1">
-                    <a:schemeClr val="accent1"/>
-                  </a:fillRef>
-                  <a:effectRef idx="0">
-                    <a:schemeClr val="accent1"/>
-                  </a:effectRef>
-                  <a:fontRef idx="minor">
-                    <a:schemeClr val="lt1"/>
-                  </a:fontRef>
-                </p:style>
-                <p:txBody>
-                  <a:bodyPr lIns="91440" tIns="45720" rIns="91440" bIns="45720" spcCol="0" rtlCol="0" anchor="ctr"/>
-                  <a:lstStyle/>
-                  <a:p>
-                    <a:pPr algn="ctr"/>
-                    <a:endParaRPr lang="en-US"/>
-                  </a:p>
-                </p:txBody>
-              </p:sp>
-              <p:cxnSp>
-                <p:nvCxnSpPr>
-                  <p:cNvPr id="207" name="Elbow Connector 206"/>
-                  <p:cNvCxnSpPr>
-                    <a:stCxn id="215" idx="2"/>
-                    <a:endCxn id="39" idx="0"/>
-                  </p:cNvCxnSpPr>
-                  <p:nvPr/>
-                </p:nvCxnSpPr>
-                <p:spPr>
-                  <a:xfrm rot="16200000" flipH="1">
-                    <a:off x="653208" y="629468"/>
-                    <a:ext cx="80765" cy="906307"/>
-                  </a:xfrm>
-                  <a:prstGeom prst="bentConnector3">
-                    <a:avLst>
-                      <a:gd name="adj1" fmla="val 50000"/>
-                    </a:avLst>
-                  </a:prstGeom>
-                  <a:ln w="6350">
-                    <a:solidFill>
-                      <a:srgbClr val="0070C0"/>
-                    </a:solidFill>
-                  </a:ln>
-                </p:spPr>
-                <p:style>
-                  <a:lnRef idx="1">
-                    <a:schemeClr val="accent1"/>
-                  </a:lnRef>
-                  <a:fillRef idx="0">
-                    <a:schemeClr val="accent1"/>
-                  </a:fillRef>
-                  <a:effectRef idx="0">
-                    <a:schemeClr val="accent1"/>
-                  </a:effectRef>
-                  <a:fontRef idx="minor">
-                    <a:schemeClr val="tx1"/>
-                  </a:fontRef>
-                </p:style>
-              </p:cxnSp>
-              <p:sp>
-                <p:nvSpPr>
-                  <p:cNvPr id="208" name="Rectangle 207"/>
-                  <p:cNvSpPr/>
-                  <p:nvPr/>
-                </p:nvSpPr>
-                <p:spPr>
-                  <a:xfrm>
-                    <a:off x="240437" y="690729"/>
-                    <a:ext cx="1648969" cy="201646"/>
-                  </a:xfrm>
-                  <a:prstGeom prst="rect">
-                    <a:avLst/>
-                  </a:prstGeom>
-                  <a:noFill/>
-                  <a:ln w="6350">
-                    <a:solidFill>
-                      <a:srgbClr val="0070C0"/>
-                    </a:solidFill>
-                  </a:ln>
-                </p:spPr>
-                <p:style>
-                  <a:lnRef idx="2">
-                    <a:schemeClr val="accent1">
-                      <a:shade val="50000"/>
-                    </a:schemeClr>
-                  </a:lnRef>
-                  <a:fillRef idx="1">
-                    <a:schemeClr val="accent1"/>
-                  </a:fillRef>
-                  <a:effectRef idx="0">
-                    <a:schemeClr val="accent1"/>
-                  </a:effectRef>
-                  <a:fontRef idx="minor">
-                    <a:schemeClr val="lt1"/>
-                  </a:fontRef>
-                </p:style>
-                <p:txBody>
-                  <a:bodyPr lIns="91440" tIns="45720" rIns="91440" bIns="45720" spcCol="0" rtlCol="0" anchor="ctr"/>
-                  <a:lstStyle/>
-                  <a:p>
-                    <a:pPr algn="ctr"/>
-                    <a:r>
-                      <a:rPr lang="en-US" sz="1100" b="1" dirty="0">
-                        <a:solidFill>
-                          <a:srgbClr val="0070C0"/>
-                        </a:solidFill>
-                      </a:rPr>
-                      <a:t>ListOfModelDefinitions</a:t>
-                    </a:r>
-                  </a:p>
-                </p:txBody>
-              </p:sp>
-              <p:sp>
-                <p:nvSpPr>
-                  <p:cNvPr id="209" name="Rectangle 208"/>
-                  <p:cNvSpPr/>
-                  <p:nvPr/>
-                </p:nvSpPr>
-                <p:spPr>
-                  <a:xfrm>
-                    <a:off x="2601387" y="69680"/>
-                    <a:ext cx="582169" cy="244414"/>
-                  </a:xfrm>
-                  <a:prstGeom prst="rect">
-                    <a:avLst/>
-                  </a:prstGeom>
-                  <a:noFill/>
-                  <a:ln w="6350">
-                    <a:solidFill>
-                      <a:schemeClr val="tx1"/>
-                    </a:solidFill>
-                  </a:ln>
-                </p:spPr>
-                <p:style>
-                  <a:lnRef idx="2">
-                    <a:schemeClr val="accent1">
-                      <a:shade val="50000"/>
-                    </a:schemeClr>
-                  </a:lnRef>
-                  <a:fillRef idx="1">
-                    <a:schemeClr val="accent1"/>
-                  </a:fillRef>
-                  <a:effectRef idx="0">
-                    <a:schemeClr val="accent1"/>
-                  </a:effectRef>
-                  <a:fontRef idx="minor">
-                    <a:schemeClr val="lt1"/>
-                  </a:fontRef>
-                </p:style>
-                <p:txBody>
-                  <a:bodyPr lIns="91440" tIns="45720" rIns="91440" bIns="45720" spcCol="0" rtlCol="0" anchor="ctr"/>
-                  <a:lstStyle/>
-                  <a:p>
-                    <a:pPr algn="ctr"/>
-                    <a:r>
-                      <a:rPr lang="en-US" sz="1100" b="1" dirty="0">
-                        <a:solidFill>
-                          <a:schemeClr val="tx1"/>
-                        </a:solidFill>
-                      </a:rPr>
-                      <a:t>SBase</a:t>
-                    </a:r>
-                  </a:p>
-                </p:txBody>
-              </p:sp>
-              <p:sp>
-                <p:nvSpPr>
-                  <p:cNvPr id="210" name="Isosceles Triangle 209"/>
-                  <p:cNvSpPr/>
-                  <p:nvPr/>
-                </p:nvSpPr>
-                <p:spPr>
-                  <a:xfrm>
-                    <a:off x="2812871" y="313743"/>
-                    <a:ext cx="159199" cy="114300"/>
-                  </a:xfrm>
-                  <a:prstGeom prst="triangle">
-                    <a:avLst/>
-                  </a:prstGeom>
-                  <a:noFill/>
-                  <a:ln w="6350">
-                    <a:solidFill>
-                      <a:schemeClr val="tx1"/>
-                    </a:solidFill>
-                  </a:ln>
-                </p:spPr>
-                <p:style>
-                  <a:lnRef idx="2">
-                    <a:schemeClr val="accent1">
-                      <a:shade val="50000"/>
-                    </a:schemeClr>
-                  </a:lnRef>
-                  <a:fillRef idx="1">
-                    <a:schemeClr val="accent1"/>
-                  </a:fillRef>
-                  <a:effectRef idx="0">
-                    <a:schemeClr val="accent1"/>
-                  </a:effectRef>
-                  <a:fontRef idx="minor">
-                    <a:schemeClr val="lt1"/>
-                  </a:fontRef>
-                </p:style>
-                <p:txBody>
-                  <a:bodyPr lIns="91440" tIns="45720" rIns="91440" bIns="45720" spcCol="0" rtlCol="0" anchor="ctr"/>
-                  <a:lstStyle/>
-                  <a:p>
-                    <a:pPr algn="ctr"/>
-                    <a:endParaRPr lang="en-US" sz="1100" b="1" dirty="0">
-                      <a:solidFill>
-                        <a:schemeClr val="tx1"/>
-                      </a:solidFill>
-                    </a:endParaRPr>
-                  </a:p>
-                </p:txBody>
-              </p:sp>
-              <p:cxnSp>
-                <p:nvCxnSpPr>
-                  <p:cNvPr id="211" name="Elbow Connector 210"/>
-                  <p:cNvCxnSpPr>
-                    <a:stCxn id="208" idx="3"/>
-                    <a:endCxn id="210" idx="3"/>
-                  </p:cNvCxnSpPr>
-                  <p:nvPr/>
-                </p:nvCxnSpPr>
-                <p:spPr>
-                  <a:xfrm flipV="1">
-                    <a:off x="1889406" y="428043"/>
-                    <a:ext cx="1003065" cy="363509"/>
-                  </a:xfrm>
-                  <a:prstGeom prst="bentConnector2">
-                    <a:avLst/>
-                  </a:prstGeom>
-                  <a:ln w="6350">
-                    <a:solidFill>
-                      <a:srgbClr val="0070C0"/>
-                    </a:solidFill>
-                  </a:ln>
-                </p:spPr>
-                <p:style>
-                  <a:lnRef idx="1">
-                    <a:schemeClr val="accent1"/>
-                  </a:lnRef>
-                  <a:fillRef idx="0">
-                    <a:schemeClr val="accent1"/>
-                  </a:fillRef>
-                  <a:effectRef idx="0">
-                    <a:schemeClr val="accent1"/>
-                  </a:effectRef>
-                  <a:fontRef idx="minor">
-                    <a:schemeClr val="tx1"/>
-                  </a:fontRef>
-                </p:style>
-              </p:cxnSp>
-              <p:sp>
-                <p:nvSpPr>
-                  <p:cNvPr id="212" name="Rectangle 211"/>
-                  <p:cNvSpPr/>
-                  <p:nvPr/>
-                </p:nvSpPr>
-                <p:spPr>
-                  <a:xfrm>
-                    <a:off x="89253" y="375917"/>
-                    <a:ext cx="1252266" cy="369332"/>
-                  </a:xfrm>
-                  <a:prstGeom prst="rect">
-                    <a:avLst/>
-                  </a:prstGeom>
-                </p:spPr>
-                <p:txBody>
-                  <a:bodyPr wrap="none" lIns="91440" tIns="45720" rIns="91440" bIns="45720">
-                    <a:spAutoFit/>
-                  </a:bodyPr>
-                  <a:lstStyle/>
-                  <a:p>
-                    <a:r>
-                      <a:rPr lang="en-US" sz="900" dirty="0" err="1">
-                        <a:solidFill>
-                          <a:srgbClr val="00B050"/>
-                        </a:solidFill>
-                      </a:rPr>
-                      <a:t>listOfModelDefinitions</a:t>
-                    </a:r>
-                    <a:endParaRPr lang="en-US" sz="900" dirty="0">
-                      <a:solidFill>
-                        <a:srgbClr val="00B050"/>
-                      </a:solidFill>
-                    </a:endParaRPr>
-                  </a:p>
-                  <a:p>
-                    <a:r>
-                      <a:rPr lang="en-US" sz="900" dirty="0">
-                        <a:solidFill>
-                          <a:srgbClr val="00B050"/>
-                        </a:solidFill>
-                      </a:rPr>
-                      <a:t>0,1</a:t>
-                    </a:r>
-                  </a:p>
-                </p:txBody>
-              </p:sp>
-              <p:sp>
-                <p:nvSpPr>
-                  <p:cNvPr id="213" name="Rectangle 212"/>
-                  <p:cNvSpPr/>
-                  <p:nvPr/>
-                </p:nvSpPr>
-                <p:spPr>
-                  <a:xfrm>
-                    <a:off x="1952364" y="1086559"/>
-                    <a:ext cx="820514" cy="304800"/>
-                  </a:xfrm>
-                  <a:prstGeom prst="rect">
-                    <a:avLst/>
-                  </a:prstGeom>
-                  <a:noFill/>
-                  <a:ln w="6350">
-                    <a:solidFill>
-                      <a:schemeClr val="tx1"/>
-                    </a:solidFill>
-                  </a:ln>
-                </p:spPr>
-                <p:style>
-                  <a:lnRef idx="2">
-                    <a:schemeClr val="accent1">
-                      <a:shade val="50000"/>
-                    </a:schemeClr>
-                  </a:lnRef>
-                  <a:fillRef idx="1">
-                    <a:schemeClr val="accent1"/>
-                  </a:fillRef>
-                  <a:effectRef idx="0">
-                    <a:schemeClr val="accent1"/>
-                  </a:effectRef>
-                  <a:fontRef idx="minor">
-                    <a:schemeClr val="lt1"/>
-                  </a:fontRef>
-                </p:style>
-                <p:txBody>
-                  <a:bodyPr lIns="91440" tIns="45720" rIns="91440" bIns="45720" spcCol="0" rtlCol="0" anchor="ctr"/>
-                  <a:lstStyle/>
-                  <a:p>
-                    <a:pPr algn="ctr"/>
-                    <a:r>
-                      <a:rPr lang="en-US" sz="1100" b="1" dirty="0" smtClean="0">
-                        <a:solidFill>
-                          <a:sysClr val="windowText" lastClr="000000"/>
-                        </a:solidFill>
-                      </a:rPr>
-                      <a:t>Model </a:t>
-                    </a:r>
-                    <a:r>
-                      <a:rPr lang="en-US" sz="1100" b="1" i="1" dirty="0">
-                        <a:solidFill>
-                          <a:srgbClr val="00B050"/>
-                        </a:solidFill>
-                      </a:rPr>
-                      <a:t>(extended</a:t>
-                    </a:r>
-                    <a:r>
-                      <a:rPr lang="en-US" sz="1100" b="1" i="1" dirty="0" smtClean="0">
-                        <a:solidFill>
-                          <a:srgbClr val="00B050"/>
-                        </a:solidFill>
-                      </a:rPr>
-                      <a:t>)</a:t>
-                    </a:r>
-                    <a:endParaRPr lang="en-US" sz="1100" b="1" dirty="0">
-                      <a:solidFill>
-                        <a:schemeClr val="tx1"/>
-                      </a:solidFill>
-                    </a:endParaRPr>
-                  </a:p>
-                </p:txBody>
-              </p:sp>
-              <p:sp>
-                <p:nvSpPr>
-                  <p:cNvPr id="214" name="Rectangle 213"/>
-                  <p:cNvSpPr/>
-                  <p:nvPr/>
-                </p:nvSpPr>
-                <p:spPr>
-                  <a:xfrm>
-                    <a:off x="186351" y="879324"/>
-                    <a:ext cx="950901" cy="369332"/>
-                  </a:xfrm>
-                  <a:prstGeom prst="rect">
-                    <a:avLst/>
-                  </a:prstGeom>
-                  <a:ln>
-                    <a:noFill/>
-                  </a:ln>
-                </p:spPr>
-                <p:txBody>
-                  <a:bodyPr wrap="none" lIns="91440" tIns="45720" rIns="91440" bIns="45720">
-                    <a:spAutoFit/>
-                  </a:bodyPr>
-                  <a:lstStyle/>
-                  <a:p>
-                    <a:r>
-                      <a:rPr lang="en-US" sz="900" dirty="0" err="1" smtClean="0">
-                        <a:solidFill>
-                          <a:srgbClr val="0070C0"/>
-                        </a:solidFill>
-                      </a:rPr>
-                      <a:t>modelDefinition</a:t>
-                    </a:r>
-                    <a:endParaRPr lang="en-US" sz="900" dirty="0">
-                      <a:solidFill>
-                        <a:srgbClr val="0070C0"/>
-                      </a:solidFill>
-                    </a:endParaRPr>
-                  </a:p>
-                  <a:p>
-                    <a:r>
-                      <a:rPr lang="en-US" sz="900" dirty="0">
-                        <a:solidFill>
-                          <a:srgbClr val="0070C0"/>
-                        </a:solidFill>
-                      </a:rPr>
-                      <a:t>0,…,*</a:t>
-                    </a:r>
-                  </a:p>
-                </p:txBody>
-              </p:sp>
-              <p:sp>
-                <p:nvSpPr>
-                  <p:cNvPr id="215" name="Diamond 214"/>
-                  <p:cNvSpPr/>
-                  <p:nvPr/>
-                </p:nvSpPr>
-                <p:spPr>
-                  <a:xfrm>
-                    <a:off x="207002" y="889842"/>
-                    <a:ext cx="66869" cy="152398"/>
-                  </a:xfrm>
-                  <a:prstGeom prst="diamond">
-                    <a:avLst/>
-                  </a:prstGeom>
-                  <a:solidFill>
-                    <a:srgbClr val="0070C0"/>
-                  </a:solidFill>
-                  <a:ln w="6350">
-                    <a:solidFill>
-                      <a:srgbClr val="0070C0"/>
-                    </a:solidFill>
-                  </a:ln>
-                </p:spPr>
-                <p:style>
-                  <a:lnRef idx="2">
-                    <a:schemeClr val="accent1">
-                      <a:shade val="50000"/>
-                    </a:schemeClr>
-                  </a:lnRef>
-                  <a:fillRef idx="1">
-                    <a:schemeClr val="accent1"/>
-                  </a:fillRef>
-                  <a:effectRef idx="0">
-                    <a:schemeClr val="accent1"/>
-                  </a:effectRef>
-                  <a:fontRef idx="minor">
-                    <a:schemeClr val="lt1"/>
-                  </a:fontRef>
-                </p:style>
-                <p:txBody>
-                  <a:bodyPr lIns="91440" tIns="45720" rIns="91440" bIns="45720" spcCol="0" rtlCol="0" anchor="ctr"/>
-                  <a:lstStyle/>
-                  <a:p>
-                    <a:pPr algn="ctr"/>
-                    <a:endParaRPr lang="en-US">
-                      <a:solidFill>
-                        <a:srgbClr val="0070C0"/>
-                      </a:solidFill>
-                    </a:endParaRPr>
-                  </a:p>
-                </p:txBody>
-              </p:sp>
-              <p:cxnSp>
-                <p:nvCxnSpPr>
-                  <p:cNvPr id="216" name="Elbow Connector 215"/>
-                  <p:cNvCxnSpPr>
-                    <a:stCxn id="205" idx="2"/>
-                    <a:endCxn id="210" idx="3"/>
-                  </p:cNvCxnSpPr>
-                  <p:nvPr/>
-                </p:nvCxnSpPr>
-                <p:spPr>
-                  <a:xfrm rot="16200000" flipH="1">
-                    <a:off x="2054206" y="-410223"/>
-                    <a:ext cx="113949" cy="1562581"/>
-                  </a:xfrm>
-                  <a:prstGeom prst="bentConnector3">
-                    <a:avLst>
-                      <a:gd name="adj1" fmla="val 199308"/>
-                    </a:avLst>
-                  </a:prstGeom>
-                  <a:ln w="6350">
-                    <a:solidFill>
-                      <a:schemeClr val="tx1"/>
-                    </a:solidFill>
-                  </a:ln>
-                </p:spPr>
-                <p:style>
-                  <a:lnRef idx="1">
-                    <a:schemeClr val="accent1"/>
-                  </a:lnRef>
-                  <a:fillRef idx="0">
-                    <a:schemeClr val="accent1"/>
-                  </a:fillRef>
-                  <a:effectRef idx="0">
-                    <a:schemeClr val="accent1"/>
-                  </a:effectRef>
-                  <a:fontRef idx="minor">
-                    <a:schemeClr val="tx1"/>
-                  </a:fontRef>
-                </p:style>
-              </p:cxnSp>
-              <p:cxnSp>
-                <p:nvCxnSpPr>
-                  <p:cNvPr id="217" name="Elbow Connector 216"/>
-                  <p:cNvCxnSpPr>
-                    <a:stCxn id="213" idx="3"/>
-                    <a:endCxn id="210" idx="3"/>
-                  </p:cNvCxnSpPr>
-                  <p:nvPr/>
-                </p:nvCxnSpPr>
-                <p:spPr>
-                  <a:xfrm flipV="1">
-                    <a:off x="2772878" y="428043"/>
-                    <a:ext cx="119593" cy="810916"/>
-                  </a:xfrm>
-                  <a:prstGeom prst="bentConnector2">
-                    <a:avLst/>
-                  </a:prstGeom>
-                  <a:ln w="6350">
-                    <a:solidFill>
-                      <a:schemeClr val="tx1"/>
-                    </a:solidFill>
-                  </a:ln>
-                </p:spPr>
-                <p:style>
-                  <a:lnRef idx="1">
-                    <a:schemeClr val="accent1"/>
-                  </a:lnRef>
-                  <a:fillRef idx="0">
-                    <a:schemeClr val="accent1"/>
-                  </a:fillRef>
-                  <a:effectRef idx="0">
-                    <a:schemeClr val="accent1"/>
-                  </a:effectRef>
-                  <a:fontRef idx="minor">
-                    <a:schemeClr val="tx1"/>
-                  </a:fontRef>
-                </p:style>
-              </p:cxnSp>
-              <p:cxnSp>
-                <p:nvCxnSpPr>
-                  <p:cNvPr id="218" name="Elbow Connector 217"/>
-                  <p:cNvCxnSpPr>
-                    <a:stCxn id="206" idx="2"/>
-                    <a:endCxn id="219" idx="0"/>
-                  </p:cNvCxnSpPr>
-                  <p:nvPr/>
-                </p:nvCxnSpPr>
-                <p:spPr>
-                  <a:xfrm rot="16200000" flipH="1">
-                    <a:off x="-610490" y="1219751"/>
-                    <a:ext cx="2603274" cy="1092742"/>
-                  </a:xfrm>
-                  <a:prstGeom prst="bentConnector3">
-                    <a:avLst>
-                      <a:gd name="adj1" fmla="val 96598"/>
-                    </a:avLst>
-                  </a:prstGeom>
-                  <a:ln w="6350">
-                    <a:solidFill>
-                      <a:schemeClr val="tx1"/>
-                    </a:solidFill>
-                  </a:ln>
-                </p:spPr>
-                <p:style>
-                  <a:lnRef idx="1">
-                    <a:schemeClr val="accent1"/>
-                  </a:lnRef>
-                  <a:fillRef idx="0">
-                    <a:schemeClr val="accent1"/>
-                  </a:fillRef>
-                  <a:effectRef idx="0">
-                    <a:schemeClr val="accent1"/>
-                  </a:effectRef>
-                  <a:fontRef idx="minor">
-                    <a:schemeClr val="tx1"/>
-                  </a:fontRef>
-                </p:style>
-              </p:cxnSp>
-              <p:sp>
-                <p:nvSpPr>
-                  <p:cNvPr id="219" name="Rectangle 218"/>
-                  <p:cNvSpPr/>
-                  <p:nvPr/>
-                </p:nvSpPr>
-                <p:spPr>
-                  <a:xfrm>
-                    <a:off x="413033" y="3067759"/>
-                    <a:ext cx="1648969" cy="304800"/>
-                  </a:xfrm>
-                  <a:prstGeom prst="rect">
-                    <a:avLst/>
-                  </a:prstGeom>
-                  <a:noFill/>
-                  <a:ln w="6350">
-                    <a:solidFill>
-                      <a:schemeClr val="tx1"/>
-                    </a:solidFill>
-                  </a:ln>
-                </p:spPr>
-                <p:style>
-                  <a:lnRef idx="2">
-                    <a:schemeClr val="accent1">
-                      <a:shade val="50000"/>
-                    </a:schemeClr>
-                  </a:lnRef>
-                  <a:fillRef idx="1">
-                    <a:schemeClr val="accent1"/>
-                  </a:fillRef>
-                  <a:effectRef idx="0">
-                    <a:schemeClr val="accent1"/>
-                  </a:effectRef>
-                  <a:fontRef idx="minor">
-                    <a:schemeClr val="lt1"/>
-                  </a:fontRef>
-                </p:style>
-                <p:txBody>
-                  <a:bodyPr lIns="91440" tIns="45720" rIns="91440" bIns="45720" spcCol="0" rtlCol="0" anchor="ctr"/>
-                  <a:lstStyle/>
-                  <a:p>
-                    <a:pPr algn="ctr"/>
-                    <a:r>
-                      <a:rPr lang="en-US" sz="1100" b="1" dirty="0" smtClean="0">
-                        <a:solidFill>
-                          <a:sysClr val="windowText" lastClr="000000"/>
-                        </a:solidFill>
-                      </a:rPr>
-                      <a:t>Model </a:t>
-                    </a:r>
-                    <a:r>
-                      <a:rPr lang="en-US" sz="1100" b="1" i="1" dirty="0">
-                        <a:solidFill>
-                          <a:srgbClr val="00B050"/>
-                        </a:solidFill>
-                      </a:rPr>
-                      <a:t>(extended</a:t>
-                    </a:r>
-                    <a:r>
-                      <a:rPr lang="en-US" sz="1100" b="1" i="1" dirty="0" smtClean="0">
-                        <a:solidFill>
-                          <a:srgbClr val="00B050"/>
-                        </a:solidFill>
-                      </a:rPr>
-                      <a:t>)</a:t>
-                    </a:r>
-                    <a:endParaRPr lang="en-US" sz="1100" b="1" dirty="0">
-                      <a:solidFill>
-                        <a:schemeClr val="tx1"/>
-                      </a:solidFill>
-                    </a:endParaRPr>
-                  </a:p>
-                </p:txBody>
-              </p:sp>
-              <p:sp>
-                <p:nvSpPr>
-                  <p:cNvPr id="220" name="Rectangle 219"/>
-                  <p:cNvSpPr/>
-                  <p:nvPr/>
-                </p:nvSpPr>
-                <p:spPr>
-                  <a:xfrm>
-                    <a:off x="76200" y="2813952"/>
-                    <a:ext cx="484428" cy="230832"/>
-                  </a:xfrm>
-                  <a:prstGeom prst="rect">
-                    <a:avLst/>
-                  </a:prstGeom>
-                  <a:ln>
-                    <a:noFill/>
-                  </a:ln>
-                </p:spPr>
-                <p:txBody>
-                  <a:bodyPr wrap="none" lIns="91440" tIns="45720" rIns="91440" bIns="45720">
-                    <a:spAutoFit/>
-                  </a:bodyPr>
-                  <a:lstStyle/>
-                  <a:p>
-                    <a:r>
-                      <a:rPr lang="en-US" sz="900" dirty="0" smtClean="0"/>
-                      <a:t>model</a:t>
-                    </a:r>
-                    <a:endParaRPr lang="en-US" sz="900" dirty="0"/>
-                  </a:p>
-                </p:txBody>
-              </p:sp>
-              <p:cxnSp>
-                <p:nvCxnSpPr>
-                  <p:cNvPr id="221" name="Elbow Connector 220"/>
-                  <p:cNvCxnSpPr>
-                    <a:stCxn id="219" idx="3"/>
-                    <a:endCxn id="210" idx="3"/>
-                  </p:cNvCxnSpPr>
-                  <p:nvPr/>
-                </p:nvCxnSpPr>
-                <p:spPr>
-                  <a:xfrm flipV="1">
-                    <a:off x="2062002" y="428043"/>
-                    <a:ext cx="830469" cy="2792116"/>
-                  </a:xfrm>
-                  <a:prstGeom prst="bentConnector2">
-                    <a:avLst/>
-                  </a:prstGeom>
-                  <a:ln w="6350">
-                    <a:solidFill>
-                      <a:schemeClr val="tx1"/>
-                    </a:solidFill>
-                  </a:ln>
-                </p:spPr>
-                <p:style>
-                  <a:lnRef idx="1">
-                    <a:schemeClr val="accent1"/>
-                  </a:lnRef>
-                  <a:fillRef idx="0">
-                    <a:schemeClr val="accent1"/>
-                  </a:fillRef>
-                  <a:effectRef idx="0">
-                    <a:schemeClr val="accent1"/>
-                  </a:effectRef>
-                  <a:fontRef idx="minor">
-                    <a:schemeClr val="tx1"/>
-                  </a:fontRef>
-                </p:style>
-              </p:cxnSp>
-              <p:cxnSp>
-                <p:nvCxnSpPr>
-                  <p:cNvPr id="222" name="Elbow Connector 221"/>
-                  <p:cNvCxnSpPr>
-                    <a:stCxn id="206" idx="2"/>
-                    <a:endCxn id="208" idx="0"/>
-                  </p:cNvCxnSpPr>
-                  <p:nvPr/>
-                </p:nvCxnSpPr>
-                <p:spPr>
-                  <a:xfrm rot="16200000" flipH="1">
-                    <a:off x="491727" y="117534"/>
-                    <a:ext cx="226244" cy="920146"/>
-                  </a:xfrm>
-                  <a:prstGeom prst="bentConnector3">
-                    <a:avLst>
-                      <a:gd name="adj1" fmla="val 34891"/>
-                    </a:avLst>
-                  </a:prstGeom>
-                  <a:ln w="6350">
-                    <a:solidFill>
-                      <a:srgbClr val="00B050"/>
-                    </a:solidFill>
-                  </a:ln>
-                </p:spPr>
-                <p:style>
-                  <a:lnRef idx="1">
-                    <a:schemeClr val="accent1"/>
-                  </a:lnRef>
-                  <a:fillRef idx="0">
-                    <a:schemeClr val="accent1"/>
-                  </a:fillRef>
-                  <a:effectRef idx="0">
-                    <a:schemeClr val="accent1"/>
-                  </a:effectRef>
-                  <a:fontRef idx="minor">
-                    <a:schemeClr val="tx1"/>
-                  </a:fontRef>
-                </p:style>
-              </p:cxnSp>
-            </p:grpSp>
-            <p:cxnSp>
-              <p:nvCxnSpPr>
-                <p:cNvPr id="200" name="Elbow Connector 199"/>
-                <p:cNvCxnSpPr>
-                  <a:stCxn id="198" idx="2"/>
-                  <a:endCxn id="201" idx="0"/>
-                </p:cNvCxnSpPr>
-                <p:nvPr/>
-              </p:nvCxnSpPr>
-              <p:spPr>
-                <a:xfrm rot="16200000" flipH="1">
-                  <a:off x="940355" y="1447173"/>
-                  <a:ext cx="92881" cy="1206879"/>
-                </a:xfrm>
-                <a:prstGeom prst="bentConnector3">
-                  <a:avLst>
-                    <a:gd name="adj1" fmla="val 50000"/>
-                  </a:avLst>
-                </a:prstGeom>
-                <a:ln w="6350">
-                  <a:solidFill>
-                    <a:srgbClr val="0070C0"/>
-                  </a:solidFill>
-                </a:ln>
-              </p:spPr>
-              <p:style>
-                <a:lnRef idx="1">
-                  <a:schemeClr val="accent1"/>
-                </a:lnRef>
-                <a:fillRef idx="0">
-                  <a:schemeClr val="accent1"/>
-                </a:fillRef>
-                <a:effectRef idx="0">
-                  <a:schemeClr val="accent1"/>
-                </a:effectRef>
-                <a:fontRef idx="minor">
-                  <a:schemeClr val="tx1"/>
-                </a:fontRef>
-              </p:style>
-            </p:cxnSp>
-            <p:sp>
-              <p:nvSpPr>
-                <p:cNvPr id="201" name="Rectangle 200"/>
-                <p:cNvSpPr/>
-                <p:nvPr/>
-              </p:nvSpPr>
-              <p:spPr>
-                <a:xfrm>
-                  <a:off x="695547" y="2097054"/>
-                  <a:ext cx="1789375" cy="789936"/>
-                </a:xfrm>
-                <a:prstGeom prst="rect">
-                  <a:avLst/>
-                </a:prstGeom>
-                <a:noFill/>
-                <a:ln w="6350">
-                  <a:solidFill>
-                    <a:srgbClr val="0070C0"/>
-                  </a:solidFill>
-                </a:ln>
-              </p:spPr>
-              <p:style>
-                <a:lnRef idx="2">
-                  <a:schemeClr val="accent1">
-                    <a:shade val="50000"/>
-                  </a:schemeClr>
-                </a:lnRef>
-                <a:fillRef idx="1">
-                  <a:schemeClr val="accent1"/>
-                </a:fillRef>
-                <a:effectRef idx="0">
-                  <a:schemeClr val="accent1"/>
-                </a:effectRef>
-                <a:fontRef idx="minor">
-                  <a:schemeClr val="lt1"/>
-                </a:fontRef>
-              </p:style>
-              <p:txBody>
-                <a:bodyPr lIns="91440" tIns="45720" rIns="91440" bIns="45720" spcCol="0" rtlCol="0" anchor="t"/>
-                <a:lstStyle/>
-                <a:p>
-                  <a:pPr algn="ctr"/>
-                  <a:r>
-                    <a:rPr lang="en-US" sz="1100" b="1" dirty="0" err="1" smtClean="0">
-                      <a:solidFill>
-                        <a:schemeClr val="accent1"/>
-                      </a:solidFill>
-                    </a:rPr>
-                    <a:t>ExternalModelDefinition</a:t>
-                  </a:r>
-                  <a:endParaRPr lang="en-US" sz="1100" b="1" dirty="0" smtClean="0">
-                    <a:solidFill>
-                      <a:schemeClr val="accent1"/>
-                    </a:solidFill>
-                  </a:endParaRPr>
-                </a:p>
-                <a:p>
-                  <a:pPr defTabSz="417972"/>
-                  <a:r>
-                    <a:rPr lang="en-US" dirty="0" smtClean="0">
-                      <a:solidFill>
-                        <a:srgbClr val="0070C0"/>
-                      </a:solidFill>
-                    </a:rPr>
-                    <a:t>id</a:t>
-                  </a:r>
-                  <a:r>
-                    <a:rPr lang="en-US">
-                      <a:solidFill>
-                        <a:srgbClr val="0070C0"/>
-                      </a:solidFill>
-                    </a:rPr>
-                    <a:t>: </a:t>
-                  </a:r>
-                  <a:r>
-                    <a:rPr lang="en-US" smtClean="0">
-                      <a:solidFill>
-                        <a:srgbClr val="0070C0"/>
-                      </a:solidFill>
-                    </a:rPr>
-                    <a:t>SId</a:t>
-                  </a:r>
-                  <a:endParaRPr lang="en-US" dirty="0">
-                    <a:solidFill>
-                      <a:srgbClr val="0070C0"/>
-                    </a:solidFill>
-                  </a:endParaRPr>
-                </a:p>
-                <a:p>
-                  <a:pPr defTabSz="417972"/>
-                  <a:r>
-                    <a:rPr lang="en-US" dirty="0" smtClean="0">
-                      <a:solidFill>
-                        <a:srgbClr val="0070C0"/>
-                      </a:solidFill>
-                    </a:rPr>
-                    <a:t>source</a:t>
-                  </a:r>
-                  <a:r>
-                    <a:rPr lang="en-US" dirty="0">
-                      <a:solidFill>
-                        <a:srgbClr val="0070C0"/>
-                      </a:solidFill>
-                    </a:rPr>
-                    <a:t>: </a:t>
-                  </a:r>
-                  <a:r>
-                    <a:rPr lang="en-US" dirty="0" err="1" smtClean="0">
-                      <a:solidFill>
-                        <a:srgbClr val="0070C0"/>
-                      </a:solidFill>
-                    </a:rPr>
-                    <a:t>anyURI</a:t>
-                  </a:r>
-                  <a:endParaRPr lang="en-US" dirty="0" smtClean="0">
-                    <a:solidFill>
-                      <a:srgbClr val="0070C0"/>
-                    </a:solidFill>
-                  </a:endParaRPr>
-                </a:p>
-                <a:p>
-                  <a:pPr lvl="0" defTabSz="417972"/>
-                  <a:r>
-                    <a:rPr lang="en-US" dirty="0" smtClean="0">
-                      <a:solidFill>
-                        <a:srgbClr val="0070C0"/>
-                      </a:solidFill>
-                    </a:rPr>
-                    <a:t>model</a:t>
-                  </a:r>
-                  <a:r>
-                    <a:rPr lang="en-US" dirty="0">
-                      <a:solidFill>
-                        <a:srgbClr val="0070C0"/>
-                      </a:solidFill>
-                    </a:rPr>
-                    <a:t>: </a:t>
-                  </a:r>
-                  <a:r>
-                    <a:rPr lang="en-US" dirty="0" err="1">
-                      <a:solidFill>
-                        <a:srgbClr val="0070C0"/>
-                      </a:solidFill>
-                    </a:rPr>
-                    <a:t>SIdRef</a:t>
-                  </a:r>
-                  <a:r>
-                    <a:rPr lang="en-US" dirty="0">
-                      <a:solidFill>
-                        <a:srgbClr val="0070C0"/>
-                      </a:solidFill>
-                    </a:rPr>
-                    <a:t> {use=“optional”}</a:t>
-                  </a:r>
-                </a:p>
-                <a:p>
-                  <a:pPr lvl="0" defTabSz="417972"/>
-                  <a:r>
-                    <a:rPr lang="en-US" dirty="0" smtClean="0">
-                      <a:solidFill>
-                        <a:srgbClr val="0070C0"/>
-                      </a:solidFill>
-                    </a:rPr>
-                    <a:t>md5</a:t>
-                  </a:r>
-                  <a:r>
-                    <a:rPr lang="en-US" dirty="0">
-                      <a:solidFill>
-                        <a:srgbClr val="0070C0"/>
-                      </a:solidFill>
-                    </a:rPr>
-                    <a:t>: string {use=“optional</a:t>
-                  </a:r>
-                  <a:r>
-                    <a:rPr lang="en-US" dirty="0" smtClean="0">
-                      <a:solidFill>
-                        <a:srgbClr val="0070C0"/>
-                      </a:solidFill>
-                    </a:rPr>
-                    <a:t>”}</a:t>
-                  </a:r>
-                  <a:endParaRPr lang="en-US" dirty="0">
-                    <a:solidFill>
-                      <a:srgbClr val="0070C0"/>
-                    </a:solidFill>
-                  </a:endParaRPr>
-                </a:p>
-              </p:txBody>
-            </p:sp>
-            <p:sp>
-              <p:nvSpPr>
-                <p:cNvPr id="202" name="Rectangle 201"/>
-                <p:cNvSpPr/>
-                <p:nvPr/>
-              </p:nvSpPr>
-              <p:spPr>
-                <a:xfrm>
-                  <a:off x="321779" y="1864225"/>
-                  <a:ext cx="1343638" cy="369332"/>
-                </a:xfrm>
-                <a:prstGeom prst="rect">
-                  <a:avLst/>
-                </a:prstGeom>
-                <a:ln>
-                  <a:noFill/>
-                </a:ln>
-              </p:spPr>
-              <p:txBody>
-                <a:bodyPr wrap="none" lIns="91440" tIns="45720" rIns="91440" bIns="45720">
-                  <a:spAutoFit/>
-                </a:bodyPr>
-                <a:lstStyle/>
-                <a:p>
-                  <a:r>
-                    <a:rPr lang="en-US" sz="900" dirty="0" err="1" smtClean="0">
-                      <a:solidFill>
-                        <a:srgbClr val="0070C0"/>
-                      </a:solidFill>
-                    </a:rPr>
-                    <a:t>externalModelDefinition</a:t>
-                  </a:r>
-                  <a:endParaRPr lang="en-US" sz="900" dirty="0">
-                    <a:solidFill>
-                      <a:srgbClr val="0070C0"/>
-                    </a:solidFill>
-                  </a:endParaRPr>
-                </a:p>
-                <a:p>
-                  <a:r>
-                    <a:rPr lang="en-US" sz="900" dirty="0">
-                      <a:solidFill>
-                        <a:srgbClr val="0070C0"/>
-                      </a:solidFill>
-                    </a:rPr>
-                    <a:t>0,…,*</a:t>
-                  </a:r>
-                </a:p>
-              </p:txBody>
-            </p:sp>
-            <p:cxnSp>
-              <p:nvCxnSpPr>
-                <p:cNvPr id="203" name="Straight Connector 202"/>
-                <p:cNvCxnSpPr/>
-                <p:nvPr/>
-              </p:nvCxnSpPr>
-              <p:spPr>
-                <a:xfrm>
-                  <a:off x="700086" y="2309246"/>
-                  <a:ext cx="1784836" cy="0"/>
-                </a:xfrm>
-                <a:prstGeom prst="line">
-                  <a:avLst/>
-                </a:prstGeom>
-                <a:ln w="6350">
-                  <a:solidFill>
-                    <a:srgbClr val="0070C0"/>
-                  </a:solidFill>
-                </a:ln>
-              </p:spPr>
-              <p:style>
-                <a:lnRef idx="1">
-                  <a:schemeClr val="accent1"/>
-                </a:lnRef>
-                <a:fillRef idx="0">
-                  <a:schemeClr val="accent1"/>
-                </a:fillRef>
-                <a:effectRef idx="0">
-                  <a:schemeClr val="accent1"/>
-                </a:effectRef>
-                <a:fontRef idx="minor">
-                  <a:schemeClr val="tx1"/>
-                </a:fontRef>
-              </p:style>
-            </p:cxnSp>
-            <p:cxnSp>
-              <p:nvCxnSpPr>
-                <p:cNvPr id="204" name="Elbow Connector 203"/>
-                <p:cNvCxnSpPr>
-                  <a:stCxn id="201" idx="3"/>
-                  <a:endCxn id="210" idx="3"/>
-                </p:cNvCxnSpPr>
-                <p:nvPr/>
-              </p:nvCxnSpPr>
-              <p:spPr>
-                <a:xfrm flipV="1">
-                  <a:off x="2484922" y="408284"/>
-                  <a:ext cx="377871" cy="2083738"/>
-                </a:xfrm>
-                <a:prstGeom prst="bentConnector2">
-                  <a:avLst/>
-                </a:prstGeom>
-                <a:ln w="6350">
-                  <a:solidFill>
-                    <a:srgbClr val="0070C0"/>
-                  </a:solidFill>
-                </a:ln>
-              </p:spPr>
-              <p:style>
-                <a:lnRef idx="1">
-                  <a:schemeClr val="accent1"/>
-                </a:lnRef>
-                <a:fillRef idx="0">
-                  <a:schemeClr val="accent1"/>
-                </a:fillRef>
-                <a:effectRef idx="0">
-                  <a:schemeClr val="accent1"/>
-                </a:effectRef>
-                <a:fontRef idx="minor">
-                  <a:schemeClr val="tx1"/>
-                </a:fontRef>
-              </p:style>
-            </p:cxnSp>
-          </p:grpSp>
-          <p:sp>
-            <p:nvSpPr>
-              <p:cNvPr id="194" name="Rectangle 193"/>
-              <p:cNvSpPr/>
-              <p:nvPr/>
-            </p:nvSpPr>
-            <p:spPr>
-              <a:xfrm>
-                <a:off x="383356" y="1652861"/>
-                <a:ext cx="2064202" cy="204143"/>
-              </a:xfrm>
-              <a:prstGeom prst="rect">
-                <a:avLst/>
-              </a:prstGeom>
-              <a:noFill/>
-              <a:ln w="6350">
-                <a:solidFill>
-                  <a:srgbClr val="0070C0"/>
-                </a:solidFill>
-              </a:ln>
-            </p:spPr>
-            <p:style>
-              <a:lnRef idx="2">
-                <a:schemeClr val="accent1">
-                  <a:shade val="50000"/>
-                </a:schemeClr>
-              </a:lnRef>
-              <a:fillRef idx="1">
-                <a:schemeClr val="accent1"/>
-              </a:fillRef>
-              <a:effectRef idx="0">
-                <a:schemeClr val="accent1"/>
-              </a:effectRef>
-              <a:fontRef idx="minor">
-                <a:schemeClr val="lt1"/>
-              </a:fontRef>
-            </p:style>
-            <p:txBody>
-              <a:bodyPr lIns="91440" tIns="45720" rIns="91440" bIns="45720" spcCol="0" rtlCol="0" anchor="ctr"/>
-              <a:lstStyle/>
-              <a:p>
-                <a:pPr algn="ctr"/>
-                <a:r>
-                  <a:rPr lang="en-US" sz="1100" b="1" dirty="0" err="1" smtClean="0">
-                    <a:solidFill>
-                      <a:srgbClr val="0070C0"/>
-                    </a:solidFill>
-                  </a:rPr>
-                  <a:t>ListOfExternalModelDefinitions</a:t>
-                </a:r>
-                <a:endParaRPr lang="en-US" sz="1100" b="1" dirty="0">
-                  <a:solidFill>
-                    <a:srgbClr val="0070C0"/>
-                  </a:solidFill>
-                </a:endParaRPr>
-              </a:p>
-            </p:txBody>
-          </p:sp>
-          <p:cxnSp>
-            <p:nvCxnSpPr>
-              <p:cNvPr id="195" name="Elbow Connector 194"/>
-              <p:cNvCxnSpPr>
-                <a:stCxn id="194" idx="3"/>
-                <a:endCxn id="210" idx="3"/>
-              </p:cNvCxnSpPr>
-              <p:nvPr/>
-            </p:nvCxnSpPr>
-            <p:spPr>
-              <a:xfrm flipV="1">
-                <a:off x="2447558" y="408284"/>
-                <a:ext cx="415235" cy="1346649"/>
-              </a:xfrm>
-              <a:prstGeom prst="bentConnector2">
-                <a:avLst/>
-              </a:prstGeom>
-              <a:ln w="6350">
-                <a:solidFill>
-                  <a:srgbClr val="0070C0"/>
-                </a:solidFill>
-              </a:ln>
-            </p:spPr>
-            <p:style>
-              <a:lnRef idx="1">
-                <a:schemeClr val="accent1"/>
-              </a:lnRef>
-              <a:fillRef idx="0">
-                <a:schemeClr val="accent1"/>
-              </a:fillRef>
-              <a:effectRef idx="0">
-                <a:schemeClr val="accent1"/>
-              </a:effectRef>
-              <a:fontRef idx="minor">
-                <a:schemeClr val="tx1"/>
-              </a:fontRef>
-            </p:style>
-          </p:cxnSp>
-          <p:sp>
-            <p:nvSpPr>
-              <p:cNvPr id="196" name="Rectangle 195"/>
-              <p:cNvSpPr/>
-              <p:nvPr/>
-            </p:nvSpPr>
-            <p:spPr>
-              <a:xfrm>
-                <a:off x="68122" y="1394575"/>
-                <a:ext cx="1636987" cy="369332"/>
-              </a:xfrm>
-              <a:prstGeom prst="rect">
-                <a:avLst/>
-              </a:prstGeom>
-            </p:spPr>
-            <p:txBody>
-              <a:bodyPr wrap="none" lIns="91440" tIns="45720" rIns="91440" bIns="45720">
-                <a:spAutoFit/>
-              </a:bodyPr>
-              <a:lstStyle/>
-              <a:p>
-                <a:r>
-                  <a:rPr lang="en-US" sz="900" dirty="0" err="1" smtClean="0">
-                    <a:solidFill>
-                      <a:srgbClr val="00B050"/>
-                    </a:solidFill>
-                  </a:rPr>
-                  <a:t>listOfExternalModelDefinitions</a:t>
-                </a:r>
-                <a:endParaRPr lang="en-US" sz="900" dirty="0">
-                  <a:solidFill>
-                    <a:srgbClr val="00B050"/>
-                  </a:solidFill>
-                </a:endParaRPr>
-              </a:p>
-              <a:p>
-                <a:r>
-                  <a:rPr lang="en-US" sz="900" dirty="0">
-                    <a:solidFill>
-                      <a:srgbClr val="00B050"/>
-                    </a:solidFill>
-                  </a:rPr>
-                  <a:t>0,1</a:t>
-                </a:r>
-              </a:p>
-            </p:txBody>
-          </p:sp>
-          <p:cxnSp>
-            <p:nvCxnSpPr>
-              <p:cNvPr id="197" name="Elbow Connector 196"/>
-              <p:cNvCxnSpPr>
-                <a:stCxn id="206" idx="2"/>
-                <a:endCxn id="194" idx="0"/>
-              </p:cNvCxnSpPr>
-              <p:nvPr/>
-            </p:nvCxnSpPr>
-            <p:spPr>
-              <a:xfrm rot="16200000" flipH="1">
-                <a:off x="161210" y="398613"/>
-                <a:ext cx="1208135" cy="1300359"/>
-              </a:xfrm>
-              <a:prstGeom prst="bentConnector3">
-                <a:avLst>
-                  <a:gd name="adj1" fmla="val 92217"/>
-                </a:avLst>
-              </a:prstGeom>
-              <a:ln w="6350">
-                <a:solidFill>
-                  <a:srgbClr val="00B050"/>
-                </a:solidFill>
-              </a:ln>
-            </p:spPr>
-            <p:style>
-              <a:lnRef idx="1">
-                <a:schemeClr val="accent1"/>
-              </a:lnRef>
-              <a:fillRef idx="0">
-                <a:schemeClr val="accent1"/>
-              </a:fillRef>
-              <a:effectRef idx="0">
-                <a:schemeClr val="accent1"/>
-              </a:effectRef>
-              <a:fontRef idx="minor">
-                <a:schemeClr val="tx1"/>
-              </a:fontRef>
-            </p:style>
-          </p:cxnSp>
-          <p:sp>
-            <p:nvSpPr>
-              <p:cNvPr id="198" name="Diamond 197"/>
-              <p:cNvSpPr/>
-              <p:nvPr/>
-            </p:nvSpPr>
-            <p:spPr>
-              <a:xfrm>
-                <a:off x="349921" y="1851775"/>
-                <a:ext cx="66869" cy="152398"/>
-              </a:xfrm>
-              <a:prstGeom prst="diamond">
-                <a:avLst/>
-              </a:prstGeom>
-              <a:solidFill>
-                <a:srgbClr val="0070C0"/>
-              </a:solidFill>
-              <a:ln w="6350">
-                <a:solidFill>
-                  <a:srgbClr val="0070C0"/>
-                </a:solidFill>
-              </a:ln>
-            </p:spPr>
-            <p:style>
-              <a:lnRef idx="2">
-                <a:schemeClr val="accent1">
-                  <a:shade val="50000"/>
-                </a:schemeClr>
-              </a:lnRef>
-              <a:fillRef idx="1">
-                <a:schemeClr val="accent1"/>
-              </a:fillRef>
-              <a:effectRef idx="0">
-                <a:schemeClr val="accent1"/>
-              </a:effectRef>
-              <a:fontRef idx="minor">
-                <a:schemeClr val="lt1"/>
-              </a:fontRef>
-            </p:style>
-            <p:txBody>
-              <a:bodyPr lIns="91440" tIns="45720" rIns="91440" bIns="45720" spcCol="0" rtlCol="0" anchor="ctr"/>
-              <a:lstStyle/>
-              <a:p>
-                <a:pPr algn="ctr"/>
-                <a:endParaRPr lang="en-US">
-                  <a:solidFill>
-                    <a:srgbClr val="0070C0"/>
-                  </a:solidFill>
-                </a:endParaRPr>
-              </a:p>
-            </p:txBody>
-          </p:sp>
-        </p:grpSp>
         <p:sp>
           <p:nvSpPr>
-            <p:cNvPr id="39" name="Rectangle 38"/>
+            <p:cNvPr id="148" name="Rectangle 147"/>
             <p:cNvSpPr/>
             <p:nvPr/>
           </p:nvSpPr>
           <p:spPr>
             <a:xfrm>
-              <a:off x="533400" y="1103246"/>
-              <a:ext cx="1167331" cy="232000"/>
+              <a:off x="115501" y="25615"/>
+              <a:ext cx="2369421" cy="243840"/>
             </a:xfrm>
             <a:prstGeom prst="rect">
               <a:avLst/>
@@ -4639,7 +3126,169 @@
             <a:noFill/>
             <a:ln w="6350">
               <a:solidFill>
-                <a:srgbClr val="0070C0"/>
+                <a:schemeClr val="tx1"/>
+              </a:solidFill>
+            </a:ln>
+          </p:spPr>
+          <p:style>
+            <a:lnRef idx="2">
+              <a:schemeClr val="accent1">
+                <a:shade val="50000"/>
+              </a:schemeClr>
+            </a:lnRef>
+            <a:fillRef idx="1">
+              <a:schemeClr val="accent1"/>
+            </a:fillRef>
+            <a:effectRef idx="0">
+              <a:schemeClr val="accent1"/>
+            </a:effectRef>
+            <a:fontRef idx="minor">
+              <a:schemeClr val="lt1"/>
+            </a:fontRef>
+          </p:style>
+          <p:txBody>
+            <a:bodyPr rtlCol="0" anchor="t"/>
+            <a:lstStyle/>
+            <a:p>
+              <a:pPr algn="ctr"/>
+              <a:r>
+                <a:rPr lang="en-US" sz="1100" b="1" dirty="0" smtClean="0">
+                  <a:solidFill>
+                    <a:schemeClr val="tx1"/>
+                  </a:solidFill>
+                </a:rPr>
+                <a:t>SBML </a:t>
+              </a:r>
+              <a:r>
+                <a:rPr lang="en-US" b="1" i="1" dirty="0">
+                  <a:solidFill>
+                    <a:srgbClr val="00B050"/>
+                  </a:solidFill>
+                </a:rPr>
+                <a:t>(extended</a:t>
+              </a:r>
+              <a:r>
+                <a:rPr lang="en-US" b="1" i="1" dirty="0" smtClean="0">
+                  <a:solidFill>
+                    <a:srgbClr val="00B050"/>
+                  </a:solidFill>
+                </a:rPr>
+                <a:t>)</a:t>
+              </a:r>
+              <a:endParaRPr lang="en-US" b="1" dirty="0">
+                <a:solidFill>
+                  <a:schemeClr val="tx1"/>
+                </a:solidFill>
+              </a:endParaRPr>
+            </a:p>
+          </p:txBody>
+        </p:sp>
+        <p:sp>
+          <p:nvSpPr>
+            <p:cNvPr id="149" name="Diamond 148"/>
+            <p:cNvSpPr/>
+            <p:nvPr/>
+          </p:nvSpPr>
+          <p:spPr>
+            <a:xfrm>
+              <a:off x="81663" y="267448"/>
+              <a:ext cx="66869" cy="152398"/>
+            </a:xfrm>
+            <a:prstGeom prst="diamond">
+              <a:avLst/>
+            </a:prstGeom>
+            <a:solidFill>
+              <a:srgbClr val="00B050"/>
+            </a:solidFill>
+            <a:ln w="6350">
+              <a:solidFill>
+                <a:srgbClr val="00B050"/>
+              </a:solidFill>
+            </a:ln>
+          </p:spPr>
+          <p:style>
+            <a:lnRef idx="2">
+              <a:schemeClr val="accent1">
+                <a:shade val="50000"/>
+              </a:schemeClr>
+            </a:lnRef>
+            <a:fillRef idx="1">
+              <a:schemeClr val="accent1"/>
+            </a:fillRef>
+            <a:effectRef idx="0">
+              <a:schemeClr val="accent1"/>
+            </a:effectRef>
+            <a:fontRef idx="minor">
+              <a:schemeClr val="lt1"/>
+            </a:fontRef>
+          </p:style>
+          <p:txBody>
+            <a:bodyPr lIns="91440" tIns="45720" rIns="91440" bIns="45720" spcCol="0" rtlCol="0" anchor="ctr"/>
+            <a:lstStyle/>
+            <a:p>
+              <a:pPr algn="ctr"/>
+              <a:endParaRPr lang="en-US"/>
+            </a:p>
+          </p:txBody>
+        </p:sp>
+        <p:cxnSp>
+          <p:nvCxnSpPr>
+            <p:cNvPr id="150" name="Elbow Connector 149"/>
+            <p:cNvCxnSpPr>
+              <a:stCxn id="157" idx="2"/>
+              <a:endCxn id="160" idx="0"/>
+            </p:cNvCxnSpPr>
+            <p:nvPr/>
+          </p:nvCxnSpPr>
+          <p:spPr>
+            <a:xfrm rot="16200000" flipH="1">
+              <a:off x="995972" y="1811904"/>
+              <a:ext cx="160663" cy="1380599"/>
+            </a:xfrm>
+            <a:prstGeom prst="bentConnector3">
+              <a:avLst>
+                <a:gd name="adj1" fmla="val 19027"/>
+              </a:avLst>
+            </a:prstGeom>
+            <a:ln w="6350">
+              <a:solidFill>
+                <a:schemeClr val="accent1"/>
+              </a:solidFill>
+            </a:ln>
+          </p:spPr>
+          <p:style>
+            <a:lnRef idx="1">
+              <a:schemeClr val="accent1"/>
+            </a:lnRef>
+            <a:fillRef idx="0">
+              <a:schemeClr val="accent1"/>
+            </a:fillRef>
+            <a:effectRef idx="0">
+              <a:schemeClr val="accent1"/>
+            </a:effectRef>
+            <a:fontRef idx="minor">
+              <a:schemeClr val="tx1"/>
+            </a:fontRef>
+          </p:style>
+        </p:cxnSp>
+        <p:sp>
+          <p:nvSpPr>
+            <p:cNvPr id="151" name="Rectangle 150"/>
+            <p:cNvSpPr/>
+            <p:nvPr/>
+          </p:nvSpPr>
+          <p:spPr>
+            <a:xfrm>
+              <a:off x="386004" y="2070362"/>
+              <a:ext cx="1648969" cy="201646"/>
+            </a:xfrm>
+            <a:prstGeom prst="rect">
+              <a:avLst/>
+            </a:prstGeom>
+            <a:noFill/>
+            <a:ln w="6350">
+              <a:solidFill>
+                <a:schemeClr val="accent1"/>
               </a:solidFill>
             </a:ln>
           </p:spPr>
@@ -4665,30 +3314,78 @@
             <a:p>
               <a:pPr algn="ctr"/>
               <a:r>
-                <a:rPr lang="en-US" sz="1100" b="1" dirty="0" smtClean="0">
+                <a:rPr lang="en-US" sz="1100" b="1" dirty="0">
                   <a:solidFill>
-                    <a:srgbClr val="0070C0"/>
+                    <a:schemeClr val="accent1"/>
                   </a:solidFill>
                 </a:rPr>
-                <a:t>ModelDefinition</a:t>
+                <a:t>ListOfModelDefinitions</a:t>
               </a:r>
-              <a:endParaRPr lang="en-US" sz="1100" b="1" dirty="0">
-                <a:solidFill>
-                  <a:srgbClr val="0070C0"/>
-                </a:solidFill>
-              </a:endParaRPr>
             </a:p>
           </p:txBody>
         </p:sp>
         <p:sp>
           <p:nvSpPr>
-            <p:cNvPr id="41" name="Isosceles Triangle 40"/>
+            <p:cNvPr id="152" name="Rectangle 151"/>
             <p:cNvSpPr/>
             <p:nvPr/>
           </p:nvSpPr>
           <p:spPr>
-            <a:xfrm rot="5400000">
-              <a:off x="1785936" y="1162050"/>
+            <a:xfrm>
+              <a:off x="2571709" y="25041"/>
+              <a:ext cx="582169" cy="244414"/>
+            </a:xfrm>
+            <a:prstGeom prst="rect">
+              <a:avLst/>
+            </a:prstGeom>
+            <a:noFill/>
+            <a:ln w="6350">
+              <a:solidFill>
+                <a:schemeClr val="tx1"/>
+              </a:solidFill>
+            </a:ln>
+          </p:spPr>
+          <p:style>
+            <a:lnRef idx="2">
+              <a:schemeClr val="accent1">
+                <a:shade val="50000"/>
+              </a:schemeClr>
+            </a:lnRef>
+            <a:fillRef idx="1">
+              <a:schemeClr val="accent1"/>
+            </a:fillRef>
+            <a:effectRef idx="0">
+              <a:schemeClr val="accent1"/>
+            </a:effectRef>
+            <a:fontRef idx="minor">
+              <a:schemeClr val="lt1"/>
+            </a:fontRef>
+          </p:style>
+          <p:txBody>
+            <a:bodyPr lIns="91440" tIns="45720" rIns="91440" bIns="45720" spcCol="0" rtlCol="0" anchor="ctr"/>
+            <a:lstStyle/>
+            <a:p>
+              <a:pPr algn="ctr"/>
+              <a:r>
+                <a:rPr lang="en-US" sz="1100" b="1" dirty="0">
+                  <a:solidFill>
+                    <a:schemeClr val="tx1"/>
+                  </a:solidFill>
+                </a:rPr>
+                <a:t>SBase</a:t>
+              </a:r>
+            </a:p>
+          </p:txBody>
+        </p:sp>
+        <p:sp>
+          <p:nvSpPr>
+            <p:cNvPr id="153" name="Isosceles Triangle 152"/>
+            <p:cNvSpPr/>
+            <p:nvPr/>
+          </p:nvSpPr>
+          <p:spPr>
+            <a:xfrm>
+              <a:off x="2783193" y="269104"/>
               <a:ext cx="159199" cy="114300"/>
             </a:xfrm>
             <a:prstGeom prst="triangle">
@@ -4697,7 +3394,7 @@
             <a:noFill/>
             <a:ln w="6350">
               <a:solidFill>
-                <a:srgbClr val="0070C0"/>
+                <a:schemeClr val="tx1"/>
               </a:solidFill>
             </a:ln>
           </p:spPr>
@@ -4732,17 +3429,466 @@
         </p:sp>
         <p:cxnSp>
           <p:nvCxnSpPr>
-            <p:cNvPr id="42" name="Elbow Connector 41"/>
+            <p:cNvPr id="154" name="Elbow Connector 153"/>
             <p:cNvCxnSpPr>
-              <a:stCxn id="39" idx="3"/>
-              <a:endCxn id="41" idx="3"/>
+              <a:stCxn id="151" idx="3"/>
+              <a:endCxn id="153" idx="3"/>
             </p:cNvCxnSpPr>
             <p:nvPr/>
           </p:nvCxnSpPr>
           <p:spPr>
             <a:xfrm flipV="1">
-              <a:off x="1700731" y="1219201"/>
-              <a:ext cx="107655" cy="45"/>
+              <a:off x="2034973" y="383404"/>
+              <a:ext cx="827820" cy="1787781"/>
+            </a:xfrm>
+            <a:prstGeom prst="bentConnector2">
+              <a:avLst/>
+            </a:prstGeom>
+            <a:ln w="6350">
+              <a:solidFill>
+                <a:srgbClr val="0070C0"/>
+              </a:solidFill>
+            </a:ln>
+          </p:spPr>
+          <p:style>
+            <a:lnRef idx="1">
+              <a:schemeClr val="accent1"/>
+            </a:lnRef>
+            <a:fillRef idx="0">
+              <a:schemeClr val="accent1"/>
+            </a:fillRef>
+            <a:effectRef idx="0">
+              <a:schemeClr val="accent1"/>
+            </a:effectRef>
+            <a:fontRef idx="minor">
+              <a:schemeClr val="tx1"/>
+            </a:fontRef>
+          </p:style>
+        </p:cxnSp>
+        <p:sp>
+          <p:nvSpPr>
+            <p:cNvPr id="155" name="Rectangle 154"/>
+            <p:cNvSpPr/>
+            <p:nvPr/>
+          </p:nvSpPr>
+          <p:spPr>
+            <a:xfrm>
+              <a:off x="76200" y="1755550"/>
+              <a:ext cx="1252266" cy="369332"/>
+            </a:xfrm>
+            <a:prstGeom prst="rect">
+              <a:avLst/>
+            </a:prstGeom>
+          </p:spPr>
+          <p:txBody>
+            <a:bodyPr wrap="none" lIns="91440" tIns="45720" rIns="91440" bIns="45720">
+              <a:spAutoFit/>
+            </a:bodyPr>
+            <a:lstStyle/>
+            <a:p>
+              <a:r>
+                <a:rPr lang="en-US" sz="900" dirty="0" err="1">
+                  <a:solidFill>
+                    <a:srgbClr val="00B050"/>
+                  </a:solidFill>
+                </a:rPr>
+                <a:t>listOfModelDefinitions</a:t>
+              </a:r>
+              <a:endParaRPr lang="en-US" sz="900" dirty="0">
+                <a:solidFill>
+                  <a:srgbClr val="00B050"/>
+                </a:solidFill>
+              </a:endParaRPr>
+            </a:p>
+            <a:p>
+              <a:r>
+                <a:rPr lang="en-US" sz="900" dirty="0">
+                  <a:solidFill>
+                    <a:srgbClr val="00B050"/>
+                  </a:solidFill>
+                </a:rPr>
+                <a:t>0,1</a:t>
+              </a:r>
+            </a:p>
+          </p:txBody>
+        </p:sp>
+        <p:sp>
+          <p:nvSpPr>
+            <p:cNvPr id="156" name="Rectangle 155"/>
+            <p:cNvSpPr/>
+            <p:nvPr/>
+          </p:nvSpPr>
+          <p:spPr>
+            <a:xfrm>
+              <a:off x="331918" y="2258957"/>
+              <a:ext cx="950901" cy="369332"/>
+            </a:xfrm>
+            <a:prstGeom prst="rect">
+              <a:avLst/>
+            </a:prstGeom>
+            <a:ln>
+              <a:noFill/>
+            </a:ln>
+          </p:spPr>
+          <p:txBody>
+            <a:bodyPr wrap="none" lIns="91440" tIns="45720" rIns="91440" bIns="45720">
+              <a:spAutoFit/>
+            </a:bodyPr>
+            <a:lstStyle/>
+            <a:p>
+              <a:r>
+                <a:rPr lang="en-US" sz="900" dirty="0" err="1" smtClean="0">
+                  <a:solidFill>
+                    <a:srgbClr val="0070C0"/>
+                  </a:solidFill>
+                </a:rPr>
+                <a:t>modelDefinition</a:t>
+              </a:r>
+              <a:endParaRPr lang="en-US" sz="900" dirty="0">
+                <a:solidFill>
+                  <a:srgbClr val="0070C0"/>
+                </a:solidFill>
+              </a:endParaRPr>
+            </a:p>
+            <a:p>
+              <a:r>
+                <a:rPr lang="en-US" sz="900" dirty="0">
+                  <a:solidFill>
+                    <a:srgbClr val="0070C0"/>
+                  </a:solidFill>
+                </a:rPr>
+                <a:t>0,…,*</a:t>
+              </a:r>
+            </a:p>
+          </p:txBody>
+        </p:sp>
+        <p:sp>
+          <p:nvSpPr>
+            <p:cNvPr id="157" name="Diamond 156"/>
+            <p:cNvSpPr/>
+            <p:nvPr/>
+          </p:nvSpPr>
+          <p:spPr>
+            <a:xfrm>
+              <a:off x="352569" y="2269475"/>
+              <a:ext cx="66869" cy="152398"/>
+            </a:xfrm>
+            <a:prstGeom prst="diamond">
+              <a:avLst/>
+            </a:prstGeom>
+            <a:solidFill>
+              <a:srgbClr val="0070C0"/>
+            </a:solidFill>
+            <a:ln w="6350">
+              <a:solidFill>
+                <a:srgbClr val="0070C0"/>
+              </a:solidFill>
+            </a:ln>
+          </p:spPr>
+          <p:style>
+            <a:lnRef idx="2">
+              <a:schemeClr val="accent1">
+                <a:shade val="50000"/>
+              </a:schemeClr>
+            </a:lnRef>
+            <a:fillRef idx="1">
+              <a:schemeClr val="accent1"/>
+            </a:fillRef>
+            <a:effectRef idx="0">
+              <a:schemeClr val="accent1"/>
+            </a:effectRef>
+            <a:fontRef idx="minor">
+              <a:schemeClr val="lt1"/>
+            </a:fontRef>
+          </p:style>
+          <p:txBody>
+            <a:bodyPr lIns="91440" tIns="45720" rIns="91440" bIns="45720" spcCol="0" rtlCol="0" anchor="ctr"/>
+            <a:lstStyle/>
+            <a:p>
+              <a:pPr algn="ctr"/>
+              <a:endParaRPr lang="en-US">
+                <a:solidFill>
+                  <a:srgbClr val="0070C0"/>
+                </a:solidFill>
+              </a:endParaRPr>
+            </a:p>
+          </p:txBody>
+        </p:sp>
+        <p:cxnSp>
+          <p:nvCxnSpPr>
+            <p:cNvPr id="158" name="Elbow Connector 157"/>
+            <p:cNvCxnSpPr>
+              <a:stCxn id="148" idx="2"/>
+              <a:endCxn id="153" idx="3"/>
+            </p:cNvCxnSpPr>
+            <p:nvPr/>
+          </p:nvCxnSpPr>
+          <p:spPr>
+            <a:xfrm rot="16200000" flipH="1">
+              <a:off x="2024528" y="-454862"/>
+              <a:ext cx="113949" cy="1562581"/>
+            </a:xfrm>
+            <a:prstGeom prst="bentConnector3">
+              <a:avLst>
+                <a:gd name="adj1" fmla="val 104094"/>
+              </a:avLst>
+            </a:prstGeom>
+            <a:ln w="6350">
+              <a:solidFill>
+                <a:schemeClr val="tx1"/>
+              </a:solidFill>
+            </a:ln>
+          </p:spPr>
+          <p:style>
+            <a:lnRef idx="1">
+              <a:schemeClr val="accent1"/>
+            </a:lnRef>
+            <a:fillRef idx="0">
+              <a:schemeClr val="accent1"/>
+            </a:fillRef>
+            <a:effectRef idx="0">
+              <a:schemeClr val="accent1"/>
+            </a:effectRef>
+            <a:fontRef idx="minor">
+              <a:schemeClr val="tx1"/>
+            </a:fontRef>
+          </p:style>
+        </p:cxnSp>
+        <p:cxnSp>
+          <p:nvCxnSpPr>
+            <p:cNvPr id="159" name="Elbow Connector 158"/>
+            <p:cNvCxnSpPr>
+              <a:stCxn id="149" idx="2"/>
+              <a:endCxn id="160" idx="1"/>
+            </p:cNvCxnSpPr>
+            <p:nvPr/>
+          </p:nvCxnSpPr>
+          <p:spPr>
+            <a:xfrm rot="16200000" flipH="1">
+              <a:off x="-628937" y="1163881"/>
+              <a:ext cx="2315090" cy="827020"/>
+            </a:xfrm>
+            <a:prstGeom prst="bentConnector2">
+              <a:avLst/>
+            </a:prstGeom>
+            <a:ln w="6350">
+              <a:solidFill>
+                <a:schemeClr val="tx1"/>
+              </a:solidFill>
+            </a:ln>
+          </p:spPr>
+          <p:style>
+            <a:lnRef idx="1">
+              <a:schemeClr val="accent1"/>
+            </a:lnRef>
+            <a:fillRef idx="0">
+              <a:schemeClr val="accent1"/>
+            </a:fillRef>
+            <a:effectRef idx="0">
+              <a:schemeClr val="accent1"/>
+            </a:effectRef>
+            <a:fontRef idx="minor">
+              <a:schemeClr val="tx1"/>
+            </a:fontRef>
+          </p:style>
+        </p:cxnSp>
+        <p:sp>
+          <p:nvSpPr>
+            <p:cNvPr id="160" name="Rectangle 159"/>
+            <p:cNvSpPr/>
+            <p:nvPr/>
+          </p:nvSpPr>
+          <p:spPr>
+            <a:xfrm>
+              <a:off x="942118" y="2582536"/>
+              <a:ext cx="1648969" cy="304800"/>
+            </a:xfrm>
+            <a:prstGeom prst="rect">
+              <a:avLst/>
+            </a:prstGeom>
+            <a:noFill/>
+            <a:ln w="6350">
+              <a:solidFill>
+                <a:schemeClr val="tx1"/>
+              </a:solidFill>
+            </a:ln>
+          </p:spPr>
+          <p:style>
+            <a:lnRef idx="2">
+              <a:schemeClr val="accent1">
+                <a:shade val="50000"/>
+              </a:schemeClr>
+            </a:lnRef>
+            <a:fillRef idx="1">
+              <a:schemeClr val="accent1"/>
+            </a:fillRef>
+            <a:effectRef idx="0">
+              <a:schemeClr val="accent1"/>
+            </a:effectRef>
+            <a:fontRef idx="minor">
+              <a:schemeClr val="lt1"/>
+            </a:fontRef>
+          </p:style>
+          <p:txBody>
+            <a:bodyPr lIns="91440" tIns="45720" rIns="91440" bIns="45720" spcCol="0" rtlCol="0" anchor="ctr"/>
+            <a:lstStyle/>
+            <a:p>
+              <a:pPr algn="ctr"/>
+              <a:r>
+                <a:rPr lang="en-US" sz="1100" b="1" dirty="0" smtClean="0">
+                  <a:solidFill>
+                    <a:sysClr val="windowText" lastClr="000000"/>
+                  </a:solidFill>
+                </a:rPr>
+                <a:t>Model </a:t>
+              </a:r>
+              <a:r>
+                <a:rPr lang="en-US" sz="1100" b="1" i="1" dirty="0">
+                  <a:solidFill>
+                    <a:srgbClr val="00B050"/>
+                  </a:solidFill>
+                </a:rPr>
+                <a:t>(extended</a:t>
+              </a:r>
+              <a:r>
+                <a:rPr lang="en-US" sz="1100" b="1" i="1" dirty="0" smtClean="0">
+                  <a:solidFill>
+                    <a:srgbClr val="00B050"/>
+                  </a:solidFill>
+                </a:rPr>
+                <a:t>)</a:t>
+              </a:r>
+              <a:endParaRPr lang="en-US" sz="1100" b="1" dirty="0">
+                <a:solidFill>
+                  <a:schemeClr val="tx1"/>
+                </a:solidFill>
+              </a:endParaRPr>
+            </a:p>
+          </p:txBody>
+        </p:sp>
+        <p:sp>
+          <p:nvSpPr>
+            <p:cNvPr id="161" name="Rectangle 160"/>
+            <p:cNvSpPr/>
+            <p:nvPr/>
+          </p:nvSpPr>
+          <p:spPr>
+            <a:xfrm>
+              <a:off x="46522" y="2542121"/>
+              <a:ext cx="484428" cy="230832"/>
+            </a:xfrm>
+            <a:prstGeom prst="rect">
+              <a:avLst/>
+            </a:prstGeom>
+            <a:ln>
+              <a:noFill/>
+            </a:ln>
+          </p:spPr>
+          <p:txBody>
+            <a:bodyPr wrap="none" lIns="91440" tIns="45720" rIns="91440" bIns="45720">
+              <a:spAutoFit/>
+            </a:bodyPr>
+            <a:lstStyle/>
+            <a:p>
+              <a:r>
+                <a:rPr lang="en-US" sz="900" dirty="0" smtClean="0"/>
+                <a:t>model</a:t>
+              </a:r>
+              <a:endParaRPr lang="en-US" sz="900" dirty="0"/>
+            </a:p>
+          </p:txBody>
+        </p:sp>
+        <p:cxnSp>
+          <p:nvCxnSpPr>
+            <p:cNvPr id="162" name="Elbow Connector 161"/>
+            <p:cNvCxnSpPr>
+              <a:stCxn id="160" idx="3"/>
+              <a:endCxn id="153" idx="3"/>
+            </p:cNvCxnSpPr>
+            <p:nvPr/>
+          </p:nvCxnSpPr>
+          <p:spPr>
+            <a:xfrm flipV="1">
+              <a:off x="2591087" y="383404"/>
+              <a:ext cx="271706" cy="2351532"/>
+            </a:xfrm>
+            <a:prstGeom prst="bentConnector2">
+              <a:avLst/>
+            </a:prstGeom>
+            <a:ln w="6350">
+              <a:solidFill>
+                <a:schemeClr val="tx1"/>
+              </a:solidFill>
+            </a:ln>
+          </p:spPr>
+          <p:style>
+            <a:lnRef idx="1">
+              <a:schemeClr val="accent1"/>
+            </a:lnRef>
+            <a:fillRef idx="0">
+              <a:schemeClr val="accent1"/>
+            </a:fillRef>
+            <a:effectRef idx="0">
+              <a:schemeClr val="accent1"/>
+            </a:effectRef>
+            <a:fontRef idx="minor">
+              <a:schemeClr val="tx1"/>
+            </a:fontRef>
+          </p:style>
+        </p:cxnSp>
+        <p:cxnSp>
+          <p:nvCxnSpPr>
+            <p:cNvPr id="163" name="Elbow Connector 162"/>
+            <p:cNvCxnSpPr>
+              <a:stCxn id="149" idx="2"/>
+              <a:endCxn id="151" idx="0"/>
+            </p:cNvCxnSpPr>
+            <p:nvPr/>
+          </p:nvCxnSpPr>
+          <p:spPr>
+            <a:xfrm rot="16200000" flipH="1">
+              <a:off x="-162465" y="697408"/>
+              <a:ext cx="1650516" cy="1095391"/>
+            </a:xfrm>
+            <a:prstGeom prst="bentConnector3">
+              <a:avLst>
+                <a:gd name="adj1" fmla="val 91456"/>
+              </a:avLst>
+            </a:prstGeom>
+            <a:ln w="6350">
+              <a:solidFill>
+                <a:srgbClr val="00B050"/>
+              </a:solidFill>
+            </a:ln>
+          </p:spPr>
+          <p:style>
+            <a:lnRef idx="1">
+              <a:schemeClr val="accent1"/>
+            </a:lnRef>
+            <a:fillRef idx="0">
+              <a:schemeClr val="accent1"/>
+            </a:fillRef>
+            <a:effectRef idx="0">
+              <a:schemeClr val="accent1"/>
+            </a:effectRef>
+            <a:fontRef idx="minor">
+              <a:schemeClr val="tx1"/>
+            </a:fontRef>
+          </p:style>
+        </p:cxnSp>
+        <p:cxnSp>
+          <p:nvCxnSpPr>
+            <p:cNvPr id="164" name="Elbow Connector 163"/>
+            <p:cNvCxnSpPr>
+              <a:stCxn id="173" idx="2"/>
+              <a:endCxn id="165" idx="0"/>
+            </p:cNvCxnSpPr>
+            <p:nvPr/>
+          </p:nvCxnSpPr>
+          <p:spPr>
+            <a:xfrm rot="16200000" flipH="1">
+              <a:off x="944302" y="376426"/>
+              <a:ext cx="84987" cy="1206879"/>
             </a:xfrm>
             <a:prstGeom prst="bentConnector3">
               <a:avLst>
@@ -4770,6 +3916,553 @@
             </a:fontRef>
           </p:style>
         </p:cxnSp>
+        <p:sp>
+          <p:nvSpPr>
+            <p:cNvPr id="165" name="Rectangle 164"/>
+            <p:cNvSpPr/>
+            <p:nvPr/>
+          </p:nvSpPr>
+          <p:spPr>
+            <a:xfrm>
+              <a:off x="695547" y="1022360"/>
+              <a:ext cx="1789375" cy="789936"/>
+            </a:xfrm>
+            <a:prstGeom prst="rect">
+              <a:avLst/>
+            </a:prstGeom>
+            <a:noFill/>
+            <a:ln w="6350">
+              <a:solidFill>
+                <a:srgbClr val="0070C0"/>
+              </a:solidFill>
+            </a:ln>
+          </p:spPr>
+          <p:style>
+            <a:lnRef idx="2">
+              <a:schemeClr val="accent1">
+                <a:shade val="50000"/>
+              </a:schemeClr>
+            </a:lnRef>
+            <a:fillRef idx="1">
+              <a:schemeClr val="accent1"/>
+            </a:fillRef>
+            <a:effectRef idx="0">
+              <a:schemeClr val="accent1"/>
+            </a:effectRef>
+            <a:fontRef idx="minor">
+              <a:schemeClr val="lt1"/>
+            </a:fontRef>
+          </p:style>
+          <p:txBody>
+            <a:bodyPr lIns="91440" tIns="45720" rIns="91440" bIns="45720" spcCol="0" rtlCol="0" anchor="t"/>
+            <a:lstStyle/>
+            <a:p>
+              <a:pPr algn="ctr"/>
+              <a:r>
+                <a:rPr lang="en-US" sz="1100" b="1" dirty="0" err="1" smtClean="0">
+                  <a:solidFill>
+                    <a:schemeClr val="accent1"/>
+                  </a:solidFill>
+                </a:rPr>
+                <a:t>ExternalModelDefinition</a:t>
+              </a:r>
+              <a:endParaRPr lang="en-US" sz="1100" b="1" dirty="0" smtClean="0">
+                <a:solidFill>
+                  <a:schemeClr val="accent1"/>
+                </a:solidFill>
+              </a:endParaRPr>
+            </a:p>
+            <a:p>
+              <a:pPr defTabSz="417972"/>
+              <a:r>
+                <a:rPr lang="en-US" dirty="0" smtClean="0">
+                  <a:solidFill>
+                    <a:srgbClr val="0070C0"/>
+                  </a:solidFill>
+                </a:rPr>
+                <a:t>id</a:t>
+              </a:r>
+              <a:r>
+                <a:rPr lang="en-US">
+                  <a:solidFill>
+                    <a:srgbClr val="0070C0"/>
+                  </a:solidFill>
+                </a:rPr>
+                <a:t>: </a:t>
+              </a:r>
+              <a:r>
+                <a:rPr lang="en-US" smtClean="0">
+                  <a:solidFill>
+                    <a:srgbClr val="0070C0"/>
+                  </a:solidFill>
+                </a:rPr>
+                <a:t>SId</a:t>
+              </a:r>
+              <a:endParaRPr lang="en-US" dirty="0">
+                <a:solidFill>
+                  <a:srgbClr val="0070C0"/>
+                </a:solidFill>
+              </a:endParaRPr>
+            </a:p>
+            <a:p>
+              <a:pPr defTabSz="417972"/>
+              <a:r>
+                <a:rPr lang="en-US" dirty="0" smtClean="0">
+                  <a:solidFill>
+                    <a:srgbClr val="0070C0"/>
+                  </a:solidFill>
+                </a:rPr>
+                <a:t>source</a:t>
+              </a:r>
+              <a:r>
+                <a:rPr lang="en-US" dirty="0">
+                  <a:solidFill>
+                    <a:srgbClr val="0070C0"/>
+                  </a:solidFill>
+                </a:rPr>
+                <a:t>: </a:t>
+              </a:r>
+              <a:r>
+                <a:rPr lang="en-US" dirty="0" err="1" smtClean="0">
+                  <a:solidFill>
+                    <a:srgbClr val="0070C0"/>
+                  </a:solidFill>
+                </a:rPr>
+                <a:t>anyURI</a:t>
+              </a:r>
+              <a:endParaRPr lang="en-US" dirty="0" smtClean="0">
+                <a:solidFill>
+                  <a:srgbClr val="0070C0"/>
+                </a:solidFill>
+              </a:endParaRPr>
+            </a:p>
+            <a:p>
+              <a:pPr lvl="0" defTabSz="417972"/>
+              <a:r>
+                <a:rPr lang="en-US" dirty="0" smtClean="0">
+                  <a:solidFill>
+                    <a:srgbClr val="0070C0"/>
+                  </a:solidFill>
+                </a:rPr>
+                <a:t>model</a:t>
+              </a:r>
+              <a:r>
+                <a:rPr lang="en-US" dirty="0">
+                  <a:solidFill>
+                    <a:srgbClr val="0070C0"/>
+                  </a:solidFill>
+                </a:rPr>
+                <a:t>: </a:t>
+              </a:r>
+              <a:r>
+                <a:rPr lang="en-US" dirty="0" err="1">
+                  <a:solidFill>
+                    <a:srgbClr val="0070C0"/>
+                  </a:solidFill>
+                </a:rPr>
+                <a:t>SIdRef</a:t>
+              </a:r>
+              <a:r>
+                <a:rPr lang="en-US" dirty="0">
+                  <a:solidFill>
+                    <a:srgbClr val="0070C0"/>
+                  </a:solidFill>
+                </a:rPr>
+                <a:t> {use=“optional”}</a:t>
+              </a:r>
+            </a:p>
+            <a:p>
+              <a:pPr lvl="0" defTabSz="417972"/>
+              <a:r>
+                <a:rPr lang="en-US" dirty="0" smtClean="0">
+                  <a:solidFill>
+                    <a:srgbClr val="0070C0"/>
+                  </a:solidFill>
+                </a:rPr>
+                <a:t>md5</a:t>
+              </a:r>
+              <a:r>
+                <a:rPr lang="en-US" dirty="0">
+                  <a:solidFill>
+                    <a:srgbClr val="0070C0"/>
+                  </a:solidFill>
+                </a:rPr>
+                <a:t>: string {use=“optional</a:t>
+              </a:r>
+              <a:r>
+                <a:rPr lang="en-US" dirty="0" smtClean="0">
+                  <a:solidFill>
+                    <a:srgbClr val="0070C0"/>
+                  </a:solidFill>
+                </a:rPr>
+                <a:t>”}</a:t>
+              </a:r>
+              <a:endParaRPr lang="en-US" dirty="0">
+                <a:solidFill>
+                  <a:srgbClr val="0070C0"/>
+                </a:solidFill>
+              </a:endParaRPr>
+            </a:p>
+          </p:txBody>
+        </p:sp>
+        <p:sp>
+          <p:nvSpPr>
+            <p:cNvPr id="166" name="Rectangle 165"/>
+            <p:cNvSpPr/>
+            <p:nvPr/>
+          </p:nvSpPr>
+          <p:spPr>
+            <a:xfrm>
+              <a:off x="321779" y="789531"/>
+              <a:ext cx="1343638" cy="369332"/>
+            </a:xfrm>
+            <a:prstGeom prst="rect">
+              <a:avLst/>
+            </a:prstGeom>
+            <a:ln>
+              <a:noFill/>
+            </a:ln>
+          </p:spPr>
+          <p:txBody>
+            <a:bodyPr wrap="none" lIns="91440" tIns="45720" rIns="91440" bIns="45720">
+              <a:spAutoFit/>
+            </a:bodyPr>
+            <a:lstStyle/>
+            <a:p>
+              <a:r>
+                <a:rPr lang="en-US" sz="900" dirty="0" err="1" smtClean="0">
+                  <a:solidFill>
+                    <a:srgbClr val="0070C0"/>
+                  </a:solidFill>
+                </a:rPr>
+                <a:t>externalModelDefinition</a:t>
+              </a:r>
+              <a:endParaRPr lang="en-US" sz="900" dirty="0">
+                <a:solidFill>
+                  <a:srgbClr val="0070C0"/>
+                </a:solidFill>
+              </a:endParaRPr>
+            </a:p>
+            <a:p>
+              <a:r>
+                <a:rPr lang="en-US" sz="900" dirty="0">
+                  <a:solidFill>
+                    <a:srgbClr val="0070C0"/>
+                  </a:solidFill>
+                </a:rPr>
+                <a:t>0,…,*</a:t>
+              </a:r>
+            </a:p>
+          </p:txBody>
+        </p:sp>
+        <p:cxnSp>
+          <p:nvCxnSpPr>
+            <p:cNvPr id="167" name="Straight Connector 166"/>
+            <p:cNvCxnSpPr/>
+            <p:nvPr/>
+          </p:nvCxnSpPr>
+          <p:spPr>
+            <a:xfrm>
+              <a:off x="700086" y="1215621"/>
+              <a:ext cx="1784836" cy="0"/>
+            </a:xfrm>
+            <a:prstGeom prst="line">
+              <a:avLst/>
+            </a:prstGeom>
+            <a:ln w="6350">
+              <a:solidFill>
+                <a:srgbClr val="0070C0"/>
+              </a:solidFill>
+            </a:ln>
+          </p:spPr>
+          <p:style>
+            <a:lnRef idx="1">
+              <a:schemeClr val="accent1"/>
+            </a:lnRef>
+            <a:fillRef idx="0">
+              <a:schemeClr val="accent1"/>
+            </a:fillRef>
+            <a:effectRef idx="0">
+              <a:schemeClr val="accent1"/>
+            </a:effectRef>
+            <a:fontRef idx="minor">
+              <a:schemeClr val="tx1"/>
+            </a:fontRef>
+          </p:style>
+        </p:cxnSp>
+        <p:cxnSp>
+          <p:nvCxnSpPr>
+            <p:cNvPr id="168" name="Elbow Connector 167"/>
+            <p:cNvCxnSpPr>
+              <a:stCxn id="165" idx="3"/>
+              <a:endCxn id="153" idx="3"/>
+            </p:cNvCxnSpPr>
+            <p:nvPr/>
+          </p:nvCxnSpPr>
+          <p:spPr>
+            <a:xfrm flipV="1">
+              <a:off x="2484922" y="383404"/>
+              <a:ext cx="377871" cy="1033924"/>
+            </a:xfrm>
+            <a:prstGeom prst="bentConnector2">
+              <a:avLst/>
+            </a:prstGeom>
+            <a:ln w="6350">
+              <a:solidFill>
+                <a:srgbClr val="0070C0"/>
+              </a:solidFill>
+            </a:ln>
+          </p:spPr>
+          <p:style>
+            <a:lnRef idx="1">
+              <a:schemeClr val="accent1"/>
+            </a:lnRef>
+            <a:fillRef idx="0">
+              <a:schemeClr val="accent1"/>
+            </a:fillRef>
+            <a:effectRef idx="0">
+              <a:schemeClr val="accent1"/>
+            </a:effectRef>
+            <a:fontRef idx="minor">
+              <a:schemeClr val="tx1"/>
+            </a:fontRef>
+          </p:style>
+        </p:cxnSp>
+        <p:sp>
+          <p:nvSpPr>
+            <p:cNvPr id="169" name="Rectangle 168"/>
+            <p:cNvSpPr/>
+            <p:nvPr/>
+          </p:nvSpPr>
+          <p:spPr>
+            <a:xfrm>
+              <a:off x="383356" y="578167"/>
+              <a:ext cx="2064202" cy="204143"/>
+            </a:xfrm>
+            <a:prstGeom prst="rect">
+              <a:avLst/>
+            </a:prstGeom>
+            <a:noFill/>
+            <a:ln w="6350">
+              <a:solidFill>
+                <a:schemeClr val="accent1"/>
+              </a:solidFill>
+            </a:ln>
+          </p:spPr>
+          <p:style>
+            <a:lnRef idx="2">
+              <a:schemeClr val="accent1">
+                <a:shade val="50000"/>
+              </a:schemeClr>
+            </a:lnRef>
+            <a:fillRef idx="1">
+              <a:schemeClr val="accent1"/>
+            </a:fillRef>
+            <a:effectRef idx="0">
+              <a:schemeClr val="accent1"/>
+            </a:effectRef>
+            <a:fontRef idx="minor">
+              <a:schemeClr val="lt1"/>
+            </a:fontRef>
+          </p:style>
+          <p:txBody>
+            <a:bodyPr lIns="91440" tIns="45720" rIns="91440" bIns="45720" spcCol="0" rtlCol="0" anchor="ctr"/>
+            <a:lstStyle/>
+            <a:p>
+              <a:pPr algn="ctr"/>
+              <a:r>
+                <a:rPr lang="en-US" sz="1100" b="1" dirty="0" err="1" smtClean="0">
+                  <a:solidFill>
+                    <a:schemeClr val="accent1"/>
+                  </a:solidFill>
+                </a:rPr>
+                <a:t>ListOfExternalModelDefinitions</a:t>
+              </a:r>
+              <a:endParaRPr lang="en-US" sz="1100" b="1" dirty="0">
+                <a:solidFill>
+                  <a:schemeClr val="accent1"/>
+                </a:solidFill>
+              </a:endParaRPr>
+            </a:p>
+          </p:txBody>
+        </p:sp>
+        <p:cxnSp>
+          <p:nvCxnSpPr>
+            <p:cNvPr id="170" name="Elbow Connector 169"/>
+            <p:cNvCxnSpPr>
+              <a:stCxn id="169" idx="3"/>
+              <a:endCxn id="153" idx="3"/>
+            </p:cNvCxnSpPr>
+            <p:nvPr/>
+          </p:nvCxnSpPr>
+          <p:spPr>
+            <a:xfrm flipV="1">
+              <a:off x="2447558" y="383404"/>
+              <a:ext cx="415235" cy="296835"/>
+            </a:xfrm>
+            <a:prstGeom prst="bentConnector2">
+              <a:avLst/>
+            </a:prstGeom>
+            <a:ln w="6350">
+              <a:solidFill>
+                <a:srgbClr val="0070C0"/>
+              </a:solidFill>
+            </a:ln>
+          </p:spPr>
+          <p:style>
+            <a:lnRef idx="1">
+              <a:schemeClr val="accent1"/>
+            </a:lnRef>
+            <a:fillRef idx="0">
+              <a:schemeClr val="accent1"/>
+            </a:fillRef>
+            <a:effectRef idx="0">
+              <a:schemeClr val="accent1"/>
+            </a:effectRef>
+            <a:fontRef idx="minor">
+              <a:schemeClr val="tx1"/>
+            </a:fontRef>
+          </p:style>
+        </p:cxnSp>
+        <p:sp>
+          <p:nvSpPr>
+            <p:cNvPr id="171" name="Rectangle 170"/>
+            <p:cNvSpPr/>
+            <p:nvPr/>
+          </p:nvSpPr>
+          <p:spPr>
+            <a:xfrm>
+              <a:off x="68122" y="319881"/>
+              <a:ext cx="1636987" cy="369332"/>
+            </a:xfrm>
+            <a:prstGeom prst="rect">
+              <a:avLst/>
+            </a:prstGeom>
+          </p:spPr>
+          <p:txBody>
+            <a:bodyPr wrap="none" lIns="91440" tIns="45720" rIns="91440" bIns="45720">
+              <a:spAutoFit/>
+            </a:bodyPr>
+            <a:lstStyle/>
+            <a:p>
+              <a:r>
+                <a:rPr lang="en-US" sz="900" dirty="0" err="1" smtClean="0">
+                  <a:solidFill>
+                    <a:srgbClr val="00B050"/>
+                  </a:solidFill>
+                </a:rPr>
+                <a:t>listOfExternalModelDefinitions</a:t>
+              </a:r>
+              <a:endParaRPr lang="en-US" sz="900" dirty="0">
+                <a:solidFill>
+                  <a:srgbClr val="00B050"/>
+                </a:solidFill>
+              </a:endParaRPr>
+            </a:p>
+            <a:p>
+              <a:r>
+                <a:rPr lang="en-US" sz="900" dirty="0">
+                  <a:solidFill>
+                    <a:srgbClr val="00B050"/>
+                  </a:solidFill>
+                </a:rPr>
+                <a:t>0,1</a:t>
+              </a:r>
+            </a:p>
+          </p:txBody>
+        </p:sp>
+        <p:cxnSp>
+          <p:nvCxnSpPr>
+            <p:cNvPr id="172" name="Elbow Connector 171"/>
+            <p:cNvCxnSpPr>
+              <a:stCxn id="149" idx="2"/>
+              <a:endCxn id="169" idx="0"/>
+            </p:cNvCxnSpPr>
+            <p:nvPr/>
+          </p:nvCxnSpPr>
+          <p:spPr>
+            <a:xfrm rot="16200000" flipH="1">
+              <a:off x="686117" y="-151174"/>
+              <a:ext cx="158321" cy="1300359"/>
+            </a:xfrm>
+            <a:prstGeom prst="bentConnector3">
+              <a:avLst>
+                <a:gd name="adj1" fmla="val 50000"/>
+              </a:avLst>
+            </a:prstGeom>
+            <a:ln w="6350">
+              <a:solidFill>
+                <a:srgbClr val="00B050"/>
+              </a:solidFill>
+            </a:ln>
+          </p:spPr>
+          <p:style>
+            <a:lnRef idx="1">
+              <a:schemeClr val="accent1"/>
+            </a:lnRef>
+            <a:fillRef idx="0">
+              <a:schemeClr val="accent1"/>
+            </a:fillRef>
+            <a:effectRef idx="0">
+              <a:schemeClr val="accent1"/>
+            </a:effectRef>
+            <a:fontRef idx="minor">
+              <a:schemeClr val="tx1"/>
+            </a:fontRef>
+          </p:style>
+        </p:cxnSp>
+        <p:sp>
+          <p:nvSpPr>
+            <p:cNvPr id="173" name="Diamond 172"/>
+            <p:cNvSpPr/>
+            <p:nvPr/>
+          </p:nvSpPr>
+          <p:spPr>
+            <a:xfrm>
+              <a:off x="349921" y="784975"/>
+              <a:ext cx="66869" cy="152398"/>
+            </a:xfrm>
+            <a:prstGeom prst="diamond">
+              <a:avLst/>
+            </a:prstGeom>
+            <a:solidFill>
+              <a:srgbClr val="0070C0"/>
+            </a:solidFill>
+            <a:ln w="6350">
+              <a:solidFill>
+                <a:srgbClr val="0070C0"/>
+              </a:solidFill>
+            </a:ln>
+          </p:spPr>
+          <p:style>
+            <a:lnRef idx="2">
+              <a:schemeClr val="accent1">
+                <a:shade val="50000"/>
+              </a:schemeClr>
+            </a:lnRef>
+            <a:fillRef idx="1">
+              <a:schemeClr val="accent1"/>
+            </a:fillRef>
+            <a:effectRef idx="0">
+              <a:schemeClr val="accent1"/>
+            </a:effectRef>
+            <a:fontRef idx="minor">
+              <a:schemeClr val="lt1"/>
+            </a:fontRef>
+          </p:style>
+          <p:txBody>
+            <a:bodyPr lIns="91440" tIns="45720" rIns="91440" bIns="45720" spcCol="0" rtlCol="0" anchor="ctr"/>
+            <a:lstStyle/>
+            <a:p>
+              <a:pPr algn="ctr"/>
+              <a:endParaRPr lang="en-US">
+                <a:solidFill>
+                  <a:srgbClr val="0070C0"/>
+                </a:solidFill>
+              </a:endParaRPr>
+            </a:p>
+          </p:txBody>
+        </p:sp>
       </p:grpSp>
     </p:spTree>
     <p:extLst>

</xml_diff>